<commit_message>
Poster Work; Added Intro and Architecture
</commit_message>
<xml_diff>
--- a/Other/Poster_2018Wireless_BSSelVWN.pptx
+++ b/Other/Poster_2018Wireless_BSSelVWN.pptx
@@ -661,7 +661,7 @@
         <p:nvSpPr>
           <p:cNvPr id="4098" name="Rectangle 2"/>
           <p:cNvSpPr>
-            <a:spLocks noChangeArrowheads="1" noTextEdit="1"/>
+            <a:spLocks noGrp="1" noRot="1" noChangeAspect="1" noChangeArrowheads="1" noTextEdit="1"/>
           </p:cNvSpPr>
           <p:nvPr>
             <p:ph type="sldImg"/>
@@ -5408,7 +5408,7 @@
         </p:nvSpPr>
         <p:spPr bwMode="auto">
           <a:xfrm>
-            <a:off x="1984375" y="6491288"/>
+            <a:off x="21299488" y="12459494"/>
             <a:ext cx="18292763" cy="13503275"/>
           </a:xfrm>
           <a:prstGeom prst="rect">
@@ -6642,6 +6642,467 @@
               </a:rPr>
               <a:t> </a:t>
             </a:r>
+          </a:p>
+        </p:txBody>
+      </p:sp>
+      <p:sp>
+        <p:nvSpPr>
+          <p:cNvPr id="2" name="TextBox 1"/>
+          <p:cNvSpPr txBox="1"/>
+          <p:nvPr/>
+        </p:nvSpPr>
+        <p:spPr>
+          <a:xfrm>
+            <a:off x="1104900" y="6789738"/>
+            <a:ext cx="19735800" cy="4647426"/>
+          </a:xfrm>
+          <a:prstGeom prst="rect">
+            <a:avLst/>
+          </a:prstGeom>
+          <a:ln/>
+        </p:spPr>
+        <p:style>
+          <a:lnRef idx="2">
+            <a:schemeClr val="dk1"/>
+          </a:lnRef>
+          <a:fillRef idx="1">
+            <a:schemeClr val="lt1"/>
+          </a:fillRef>
+          <a:effectRef idx="0">
+            <a:schemeClr val="dk1"/>
+          </a:effectRef>
+          <a:fontRef idx="minor">
+            <a:schemeClr val="dk1"/>
+          </a:fontRef>
+        </p:style>
+        <p:txBody>
+          <a:bodyPr wrap="square" rtlCol="0">
+            <a:spAutoFit/>
+          </a:bodyPr>
+          <a:lstStyle/>
+          <a:p>
+            <a:pPr marL="514350" indent="-514350" algn="ctr">
+              <a:spcAft>
+                <a:spcPts val="1200"/>
+              </a:spcAft>
+              <a:buAutoNum type="romanUcPeriod"/>
+            </a:pPr>
+            <a:r>
+              <a:rPr lang="en-US" sz="3400" b="1" dirty="0" smtClean="0">
+                <a:solidFill>
+                  <a:srgbClr val="FF0000"/>
+                </a:solidFill>
+                <a:latin typeface="Arial" panose="020B0604020202020204" pitchFamily="34" charset="0"/>
+                <a:cs typeface="Arial" panose="020B0604020202020204" pitchFamily="34" charset="0"/>
+              </a:rPr>
+              <a:t>Motivation</a:t>
+            </a:r>
+          </a:p>
+          <a:p>
+            <a:pPr>
+              <a:spcAft>
+                <a:spcPts val="1200"/>
+              </a:spcAft>
+            </a:pPr>
+            <a:r>
+              <a:rPr lang="en-US" dirty="0" smtClean="0">
+                <a:latin typeface="Arial" panose="020B0604020202020204" pitchFamily="34" charset="0"/>
+                <a:cs typeface="Arial" panose="020B0604020202020204" pitchFamily="34" charset="0"/>
+              </a:rPr>
+              <a:t>Resource sharing has been a common practice for Mobile Network Operators (MNOs) to decrease the capital and operational expenditures of deploying and maintaining their cellular networks.  Roaming agreements and passive infrastructure sharing, such as the sharing of physical sites, tower masts, and power, saved expenditures leading to motivation in more active resource sharing, such as the reuse of backhaul and the sharing of radio access networks.  This has led to wireless virtualization, a promising approach for efficient sharing of radio resources in next-generation mobile networks.</a:t>
+            </a:r>
+          </a:p>
+          <a:p>
+            <a:pPr>
+              <a:spcAft>
+                <a:spcPts val="1200"/>
+              </a:spcAft>
+            </a:pPr>
+            <a:r>
+              <a:rPr lang="en-US" dirty="0" smtClean="0">
+                <a:latin typeface="Arial" panose="020B0604020202020204" pitchFamily="34" charset="0"/>
+                <a:cs typeface="Arial" panose="020B0604020202020204" pitchFamily="34" charset="0"/>
+              </a:rPr>
+              <a:t>Our work focuses on the problem of resource allocation for virtualized wireless network (VWN) construction.  We use a framework based on the Network without Borders (</a:t>
+            </a:r>
+            <a:r>
+              <a:rPr lang="en-US" dirty="0" err="1" smtClean="0">
+                <a:latin typeface="Arial" panose="020B0604020202020204" pitchFamily="34" charset="0"/>
+                <a:cs typeface="Arial" panose="020B0604020202020204" pitchFamily="34" charset="0"/>
+              </a:rPr>
+              <a:t>NwoB</a:t>
+            </a:r>
+            <a:r>
+              <a:rPr lang="en-US" dirty="0" smtClean="0">
+                <a:latin typeface="Arial" panose="020B0604020202020204" pitchFamily="34" charset="0"/>
+                <a:cs typeface="Arial" panose="020B0604020202020204" pitchFamily="34" charset="0"/>
+              </a:rPr>
+              <a:t>) paradigm, which introduces a service-oriented concept as a natural motivation for virtualization in mobile wireless networks (MWNs).  We model base station selection and adaptive slicing in the virtual network builder (VNB) as a stochastic optimization problem.  We then present two approaches to finding the solution, one based on a sampled deterministic equivalent program and another based on a genetic algorithm metaheuristic.</a:t>
+            </a:r>
+          </a:p>
+        </p:txBody>
+      </p:sp>
+      <p:sp>
+        <p:nvSpPr>
+          <p:cNvPr id="3" name="TextBox 2"/>
+          <p:cNvSpPr txBox="1"/>
+          <p:nvPr/>
+        </p:nvSpPr>
+        <p:spPr>
+          <a:xfrm>
+            <a:off x="1104900" y="11930876"/>
+            <a:ext cx="9608054" cy="10895290"/>
+          </a:xfrm>
+          <a:prstGeom prst="rect">
+            <a:avLst/>
+          </a:prstGeom>
+        </p:spPr>
+        <p:style>
+          <a:lnRef idx="2">
+            <a:schemeClr val="dk1"/>
+          </a:lnRef>
+          <a:fillRef idx="1">
+            <a:schemeClr val="lt1"/>
+          </a:fillRef>
+          <a:effectRef idx="0">
+            <a:schemeClr val="dk1"/>
+          </a:effectRef>
+          <a:fontRef idx="minor">
+            <a:schemeClr val="dk1"/>
+          </a:fontRef>
+        </p:style>
+        <p:txBody>
+          <a:bodyPr wrap="square" rtlCol="0">
+            <a:spAutoFit/>
+          </a:bodyPr>
+          <a:lstStyle/>
+          <a:p>
+            <a:pPr algn="ctr">
+              <a:spcAft>
+                <a:spcPts val="1200"/>
+              </a:spcAft>
+            </a:pPr>
+            <a:r>
+              <a:rPr lang="en-US" sz="3400" b="1" dirty="0" smtClean="0">
+                <a:solidFill>
+                  <a:srgbClr val="FF0000"/>
+                </a:solidFill>
+                <a:latin typeface="Arial" panose="020B0604020202020204" pitchFamily="34" charset="0"/>
+                <a:cs typeface="Arial" panose="020B0604020202020204" pitchFamily="34" charset="0"/>
+              </a:rPr>
+              <a:t>II</a:t>
+            </a:r>
+            <a:r>
+              <a:rPr lang="en-US" sz="3600" dirty="0" smtClean="0">
+                <a:solidFill>
+                  <a:srgbClr val="FF0000"/>
+                </a:solidFill>
+                <a:latin typeface="Arial" panose="020B0604020202020204" pitchFamily="34" charset="0"/>
+                <a:cs typeface="Arial" panose="020B0604020202020204" pitchFamily="34" charset="0"/>
+              </a:rPr>
+              <a:t>. </a:t>
+            </a:r>
+            <a:r>
+              <a:rPr lang="en-US" sz="3400" b="1" dirty="0" smtClean="0">
+                <a:solidFill>
+                  <a:srgbClr val="FF0000"/>
+                </a:solidFill>
+                <a:latin typeface="Arial" panose="020B0604020202020204" pitchFamily="34" charset="0"/>
+                <a:cs typeface="Arial" panose="020B0604020202020204" pitchFamily="34" charset="0"/>
+              </a:rPr>
+              <a:t>VWN Architecture</a:t>
+            </a:r>
+          </a:p>
+          <a:p>
+            <a:endParaRPr lang="en-US" sz="3600" dirty="0" smtClean="0">
+              <a:solidFill>
+                <a:srgbClr val="FF0000"/>
+              </a:solidFill>
+              <a:latin typeface="Arial" panose="020B0604020202020204" pitchFamily="34" charset="0"/>
+              <a:cs typeface="Arial" panose="020B0604020202020204" pitchFamily="34" charset="0"/>
+            </a:endParaRPr>
+          </a:p>
+          <a:p>
+            <a:endParaRPr lang="en-US" sz="3600" dirty="0">
+              <a:solidFill>
+                <a:srgbClr val="FF0000"/>
+              </a:solidFill>
+              <a:latin typeface="Arial" panose="020B0604020202020204" pitchFamily="34" charset="0"/>
+              <a:cs typeface="Arial" panose="020B0604020202020204" pitchFamily="34" charset="0"/>
+            </a:endParaRPr>
+          </a:p>
+          <a:p>
+            <a:endParaRPr lang="en-US" sz="3600" dirty="0" smtClean="0">
+              <a:solidFill>
+                <a:srgbClr val="FF0000"/>
+              </a:solidFill>
+              <a:latin typeface="Arial" panose="020B0604020202020204" pitchFamily="34" charset="0"/>
+              <a:cs typeface="Arial" panose="020B0604020202020204" pitchFamily="34" charset="0"/>
+            </a:endParaRPr>
+          </a:p>
+          <a:p>
+            <a:endParaRPr lang="en-US" sz="3600" dirty="0">
+              <a:solidFill>
+                <a:srgbClr val="FF0000"/>
+              </a:solidFill>
+              <a:latin typeface="Arial" panose="020B0604020202020204" pitchFamily="34" charset="0"/>
+              <a:cs typeface="Arial" panose="020B0604020202020204" pitchFamily="34" charset="0"/>
+            </a:endParaRPr>
+          </a:p>
+          <a:p>
+            <a:endParaRPr lang="en-US" sz="3600" dirty="0" smtClean="0">
+              <a:solidFill>
+                <a:srgbClr val="FF0000"/>
+              </a:solidFill>
+              <a:latin typeface="Arial" panose="020B0604020202020204" pitchFamily="34" charset="0"/>
+              <a:cs typeface="Arial" panose="020B0604020202020204" pitchFamily="34" charset="0"/>
+            </a:endParaRPr>
+          </a:p>
+          <a:p>
+            <a:endParaRPr lang="en-US" sz="3600" dirty="0">
+              <a:solidFill>
+                <a:srgbClr val="FF0000"/>
+              </a:solidFill>
+              <a:latin typeface="Arial" panose="020B0604020202020204" pitchFamily="34" charset="0"/>
+              <a:cs typeface="Arial" panose="020B0604020202020204" pitchFamily="34" charset="0"/>
+            </a:endParaRPr>
+          </a:p>
+          <a:p>
+            <a:endParaRPr lang="en-US" sz="3600" dirty="0" smtClean="0">
+              <a:solidFill>
+                <a:srgbClr val="FF0000"/>
+              </a:solidFill>
+              <a:latin typeface="Arial" panose="020B0604020202020204" pitchFamily="34" charset="0"/>
+              <a:cs typeface="Arial" panose="020B0604020202020204" pitchFamily="34" charset="0"/>
+            </a:endParaRPr>
+          </a:p>
+          <a:p>
+            <a:endParaRPr lang="en-US" sz="3600" dirty="0">
+              <a:solidFill>
+                <a:srgbClr val="FF0000"/>
+              </a:solidFill>
+              <a:latin typeface="Arial" panose="020B0604020202020204" pitchFamily="34" charset="0"/>
+              <a:cs typeface="Arial" panose="020B0604020202020204" pitchFamily="34" charset="0"/>
+            </a:endParaRPr>
+          </a:p>
+          <a:p>
+            <a:endParaRPr lang="en-US" sz="3600" dirty="0" smtClean="0">
+              <a:solidFill>
+                <a:srgbClr val="FF0000"/>
+              </a:solidFill>
+              <a:latin typeface="Arial" panose="020B0604020202020204" pitchFamily="34" charset="0"/>
+              <a:cs typeface="Arial" panose="020B0604020202020204" pitchFamily="34" charset="0"/>
+            </a:endParaRPr>
+          </a:p>
+          <a:p>
+            <a:pPr>
+              <a:spcAft>
+                <a:spcPts val="1200"/>
+              </a:spcAft>
+            </a:pPr>
+            <a:r>
+              <a:rPr lang="en-US" b="1" dirty="0" smtClean="0">
+                <a:solidFill>
+                  <a:schemeClr val="accent2"/>
+                </a:solidFill>
+                <a:latin typeface="Arial" panose="020B0604020202020204" pitchFamily="34" charset="0"/>
+                <a:cs typeface="Arial" panose="020B0604020202020204" pitchFamily="34" charset="0"/>
+              </a:rPr>
+              <a:t>Service Provider (SP):  </a:t>
+            </a:r>
+            <a:r>
+              <a:rPr lang="en-US" dirty="0" smtClean="0">
+                <a:solidFill>
+                  <a:schemeClr val="tx1"/>
+                </a:solidFill>
+                <a:latin typeface="Arial" panose="020B0604020202020204" pitchFamily="34" charset="0"/>
+                <a:cs typeface="Arial" panose="020B0604020202020204" pitchFamily="34" charset="0"/>
+              </a:rPr>
+              <a:t>Can be a traditional mobile virtual network operator (MVNO) that offers data, voice, and messaging services, a specialized MVNO that offers data services for specific applications (e.g. support for </a:t>
+            </a:r>
+            <a:r>
+              <a:rPr lang="en-US" dirty="0" err="1" smtClean="0">
+                <a:solidFill>
+                  <a:schemeClr val="tx1"/>
+                </a:solidFill>
+                <a:latin typeface="Arial" panose="020B0604020202020204" pitchFamily="34" charset="0"/>
+                <a:cs typeface="Arial" panose="020B0604020202020204" pitchFamily="34" charset="0"/>
+              </a:rPr>
+              <a:t>IoT</a:t>
+            </a:r>
+            <a:r>
+              <a:rPr lang="en-US" dirty="0" smtClean="0">
+                <a:solidFill>
+                  <a:schemeClr val="tx1"/>
+                </a:solidFill>
+                <a:latin typeface="Arial" panose="020B0604020202020204" pitchFamily="34" charset="0"/>
+                <a:cs typeface="Arial" panose="020B0604020202020204" pitchFamily="34" charset="0"/>
+              </a:rPr>
+              <a:t> devices), or any of the present over-the-top services.</a:t>
+            </a:r>
+          </a:p>
+          <a:p>
+            <a:pPr>
+              <a:spcAft>
+                <a:spcPts val="1200"/>
+              </a:spcAft>
+            </a:pPr>
+            <a:r>
+              <a:rPr lang="en-US" b="1" dirty="0" smtClean="0">
+                <a:solidFill>
+                  <a:schemeClr val="accent2"/>
+                </a:solidFill>
+                <a:latin typeface="Arial" panose="020B0604020202020204" pitchFamily="34" charset="0"/>
+                <a:cs typeface="Arial" panose="020B0604020202020204" pitchFamily="34" charset="0"/>
+              </a:rPr>
+              <a:t>Virtual Network Builder (VNB):</a:t>
+            </a:r>
+            <a:r>
+              <a:rPr lang="en-US" dirty="0" smtClean="0">
+                <a:solidFill>
+                  <a:schemeClr val="tx1"/>
+                </a:solidFill>
+                <a:latin typeface="Arial" panose="020B0604020202020204" pitchFamily="34" charset="0"/>
+                <a:cs typeface="Arial" panose="020B0604020202020204" pitchFamily="34" charset="0"/>
+              </a:rPr>
+              <a:t>  Consists of a Virtual Network Architect and Network Aggregator.  It composes and aggregates the virtual resources from the resource providers (RPs) to build virtual networks for the SPs.</a:t>
+            </a:r>
+          </a:p>
+          <a:p>
+            <a:pPr>
+              <a:spcAft>
+                <a:spcPts val="1200"/>
+              </a:spcAft>
+            </a:pPr>
+            <a:r>
+              <a:rPr lang="en-US" b="1" dirty="0" smtClean="0">
+                <a:solidFill>
+                  <a:schemeClr val="accent2"/>
+                </a:solidFill>
+                <a:latin typeface="Arial" panose="020B0604020202020204" pitchFamily="34" charset="0"/>
+                <a:cs typeface="Arial" panose="020B0604020202020204" pitchFamily="34" charset="0"/>
+              </a:rPr>
+              <a:t>Resource Provider (RP):</a:t>
+            </a:r>
+            <a:r>
+              <a:rPr lang="en-US" dirty="0" smtClean="0">
+                <a:solidFill>
+                  <a:schemeClr val="tx1"/>
+                </a:solidFill>
+                <a:latin typeface="Arial" panose="020B0604020202020204" pitchFamily="34" charset="0"/>
+                <a:cs typeface="Arial" panose="020B0604020202020204" pitchFamily="34" charset="0"/>
+              </a:rPr>
+              <a:t>  The owner of a set of resources that can be offered as virtual resources in a set of pools, according to contracts established with VNBs, for example.  In general, an RP will define how to slice and share its resources as virtual ones.</a:t>
+            </a:r>
+          </a:p>
+        </p:txBody>
+      </p:sp>
+      <p:pic>
+        <p:nvPicPr>
+          <p:cNvPr id="5" name="Picture 4"/>
+          <p:cNvPicPr>
+            <a:picLocks noChangeAspect="1"/>
+          </p:cNvPicPr>
+          <p:nvPr/>
+        </p:nvPicPr>
+        <p:blipFill>
+          <a:blip r:embed="rId4"/>
+          <a:stretch>
+            <a:fillRect/>
+          </a:stretch>
+        </p:blipFill>
+        <p:spPr>
+          <a:xfrm>
+            <a:off x="1305285" y="12794456"/>
+            <a:ext cx="9220345" cy="4023949"/>
+          </a:xfrm>
+          <a:prstGeom prst="rect">
+            <a:avLst/>
+          </a:prstGeom>
+        </p:spPr>
+      </p:pic>
+      <p:sp>
+        <p:nvSpPr>
+          <p:cNvPr id="6" name="TextBox 5"/>
+          <p:cNvSpPr txBox="1"/>
+          <p:nvPr/>
+        </p:nvSpPr>
+        <p:spPr>
+          <a:xfrm>
+            <a:off x="1104900" y="16949834"/>
+            <a:ext cx="9608054" cy="461665"/>
+          </a:xfrm>
+          <a:prstGeom prst="rect">
+            <a:avLst/>
+          </a:prstGeom>
+          <a:noFill/>
+        </p:spPr>
+        <p:txBody>
+          <a:bodyPr wrap="square" rtlCol="0">
+            <a:spAutoFit/>
+          </a:bodyPr>
+          <a:lstStyle/>
+          <a:p>
+            <a:pPr algn="ctr"/>
+            <a:r>
+              <a:rPr lang="en-US" b="1" dirty="0" smtClean="0"/>
+              <a:t>Fig. 1. Roles in the Networks without Borders paradigm</a:t>
+            </a:r>
+            <a:endParaRPr lang="en-US" b="1" dirty="0"/>
+          </a:p>
+        </p:txBody>
+      </p:sp>
+      <p:sp>
+        <p:nvSpPr>
+          <p:cNvPr id="7" name="TextBox 6"/>
+          <p:cNvSpPr txBox="1"/>
+          <p:nvPr/>
+        </p:nvSpPr>
+        <p:spPr>
+          <a:xfrm>
+            <a:off x="11171742" y="11930876"/>
+            <a:ext cx="9668958" cy="984885"/>
+          </a:xfrm>
+          <a:prstGeom prst="rect">
+            <a:avLst/>
+          </a:prstGeom>
+        </p:spPr>
+        <p:style>
+          <a:lnRef idx="2">
+            <a:schemeClr val="dk1"/>
+          </a:lnRef>
+          <a:fillRef idx="1">
+            <a:schemeClr val="lt1"/>
+          </a:fillRef>
+          <a:effectRef idx="0">
+            <a:schemeClr val="dk1"/>
+          </a:effectRef>
+          <a:fontRef idx="minor">
+            <a:schemeClr val="dk1"/>
+          </a:fontRef>
+        </p:style>
+        <p:txBody>
+          <a:bodyPr wrap="square" rtlCol="0">
+            <a:spAutoFit/>
+          </a:bodyPr>
+          <a:lstStyle/>
+          <a:p>
+            <a:pPr algn="ctr"/>
+            <a:r>
+              <a:rPr lang="en-US" sz="3400" b="1" dirty="0" smtClean="0">
+                <a:solidFill>
+                  <a:srgbClr val="FF0000"/>
+                </a:solidFill>
+              </a:rPr>
+              <a:t>III. VWN Construction</a:t>
+            </a:r>
+          </a:p>
+          <a:p>
+            <a:r>
+              <a:rPr lang="en-US" dirty="0" smtClean="0"/>
+              <a:t>Placeholder text</a:t>
+            </a:r>
+            <a:endParaRPr lang="en-US" sz="4400" b="1" dirty="0"/>
           </a:p>
         </p:txBody>
       </p:sp>

</xml_diff>

<commit_message>
Poster Update; New Figs
</commit_message>
<xml_diff>
--- a/Other/Poster_2018Wireless_BSSelVWN.pptx
+++ b/Other/Poster_2018Wireless_BSSelVWN.pptx
@@ -4235,6 +4235,692 @@
           <a:chExt cx="0" cy="0"/>
         </a:xfrm>
       </p:grpSpPr>
+      <p:sp>
+        <p:nvSpPr>
+          <p:cNvPr id="7" name="TextBox 6"/>
+          <p:cNvSpPr txBox="1"/>
+          <p:nvPr/>
+        </p:nvSpPr>
+        <p:spPr>
+          <a:xfrm>
+            <a:off x="11171737" y="6789738"/>
+            <a:ext cx="9668958" cy="25453122"/>
+          </a:xfrm>
+          <a:prstGeom prst="rect">
+            <a:avLst/>
+          </a:prstGeom>
+        </p:spPr>
+        <p:style>
+          <a:lnRef idx="2">
+            <a:schemeClr val="dk1"/>
+          </a:lnRef>
+          <a:fillRef idx="1">
+            <a:schemeClr val="lt1"/>
+          </a:fillRef>
+          <a:effectRef idx="0">
+            <a:schemeClr val="dk1"/>
+          </a:effectRef>
+          <a:fontRef idx="minor">
+            <a:schemeClr val="dk1"/>
+          </a:fontRef>
+        </p:style>
+        <p:txBody>
+          <a:bodyPr wrap="square" rtlCol="0">
+            <a:spAutoFit/>
+          </a:bodyPr>
+          <a:lstStyle/>
+          <a:p>
+            <a:pPr algn="ctr">
+              <a:spcAft>
+                <a:spcPts val="1200"/>
+              </a:spcAft>
+            </a:pPr>
+            <a:r>
+              <a:rPr lang="en-US" sz="3400" b="1" dirty="0" smtClean="0">
+                <a:solidFill>
+                  <a:srgbClr val="FF0000"/>
+                </a:solidFill>
+                <a:latin typeface="Arial" panose="020B0604020202020204" pitchFamily="34" charset="0"/>
+                <a:cs typeface="Arial" panose="020B0604020202020204" pitchFamily="34" charset="0"/>
+              </a:rPr>
+              <a:t>III. VWN </a:t>
+            </a:r>
+            <a:r>
+              <a:rPr lang="en-US" sz="3400" b="1" dirty="0" smtClean="0">
+                <a:solidFill>
+                  <a:srgbClr val="FF0000"/>
+                </a:solidFill>
+                <a:latin typeface="Arial" panose="020B0604020202020204" pitchFamily="34" charset="0"/>
+                <a:cs typeface="Arial" panose="020B0604020202020204" pitchFamily="34" charset="0"/>
+              </a:rPr>
+              <a:t>Construction</a:t>
+            </a:r>
+          </a:p>
+          <a:p>
+            <a:pPr>
+              <a:spcAft>
+                <a:spcPts val="1200"/>
+              </a:spcAft>
+            </a:pPr>
+            <a:endParaRPr lang="en-US" sz="3400" b="1" dirty="0">
+              <a:solidFill>
+                <a:srgbClr val="FF0000"/>
+              </a:solidFill>
+              <a:latin typeface="Arial" panose="020B0604020202020204" pitchFamily="34" charset="0"/>
+              <a:cs typeface="Arial" panose="020B0604020202020204" pitchFamily="34" charset="0"/>
+            </a:endParaRPr>
+          </a:p>
+          <a:p>
+            <a:pPr>
+              <a:spcAft>
+                <a:spcPts val="1200"/>
+              </a:spcAft>
+            </a:pPr>
+            <a:endParaRPr lang="en-US" sz="3400" b="1" dirty="0" smtClean="0">
+              <a:solidFill>
+                <a:srgbClr val="FF0000"/>
+              </a:solidFill>
+              <a:latin typeface="Arial" panose="020B0604020202020204" pitchFamily="34" charset="0"/>
+              <a:cs typeface="Arial" panose="020B0604020202020204" pitchFamily="34" charset="0"/>
+            </a:endParaRPr>
+          </a:p>
+          <a:p>
+            <a:pPr>
+              <a:spcAft>
+                <a:spcPts val="1200"/>
+              </a:spcAft>
+            </a:pPr>
+            <a:endParaRPr lang="en-US" sz="3400" b="1" dirty="0">
+              <a:solidFill>
+                <a:srgbClr val="FF0000"/>
+              </a:solidFill>
+              <a:latin typeface="Arial" panose="020B0604020202020204" pitchFamily="34" charset="0"/>
+              <a:cs typeface="Arial" panose="020B0604020202020204" pitchFamily="34" charset="0"/>
+            </a:endParaRPr>
+          </a:p>
+          <a:p>
+            <a:pPr>
+              <a:spcAft>
+                <a:spcPts val="1200"/>
+              </a:spcAft>
+            </a:pPr>
+            <a:endParaRPr lang="en-US" sz="3400" b="1" dirty="0" smtClean="0">
+              <a:solidFill>
+                <a:srgbClr val="FF0000"/>
+              </a:solidFill>
+              <a:latin typeface="Arial" panose="020B0604020202020204" pitchFamily="34" charset="0"/>
+              <a:cs typeface="Arial" panose="020B0604020202020204" pitchFamily="34" charset="0"/>
+            </a:endParaRPr>
+          </a:p>
+          <a:p>
+            <a:pPr>
+              <a:spcAft>
+                <a:spcPts val="1200"/>
+              </a:spcAft>
+            </a:pPr>
+            <a:endParaRPr lang="en-US" sz="3400" b="1" dirty="0">
+              <a:solidFill>
+                <a:srgbClr val="FF0000"/>
+              </a:solidFill>
+              <a:latin typeface="Arial" panose="020B0604020202020204" pitchFamily="34" charset="0"/>
+              <a:cs typeface="Arial" panose="020B0604020202020204" pitchFamily="34" charset="0"/>
+            </a:endParaRPr>
+          </a:p>
+          <a:p>
+            <a:pPr>
+              <a:spcAft>
+                <a:spcPts val="1200"/>
+              </a:spcAft>
+            </a:pPr>
+            <a:endParaRPr lang="en-US" sz="3400" b="1" dirty="0" smtClean="0">
+              <a:solidFill>
+                <a:srgbClr val="FF0000"/>
+              </a:solidFill>
+              <a:latin typeface="Arial" panose="020B0604020202020204" pitchFamily="34" charset="0"/>
+              <a:cs typeface="Arial" panose="020B0604020202020204" pitchFamily="34" charset="0"/>
+            </a:endParaRPr>
+          </a:p>
+          <a:p>
+            <a:pPr>
+              <a:spcAft>
+                <a:spcPts val="1200"/>
+              </a:spcAft>
+            </a:pPr>
+            <a:endParaRPr lang="en-US" sz="3400" b="1" dirty="0">
+              <a:solidFill>
+                <a:srgbClr val="FF0000"/>
+              </a:solidFill>
+              <a:latin typeface="Arial" panose="020B0604020202020204" pitchFamily="34" charset="0"/>
+              <a:cs typeface="Arial" panose="020B0604020202020204" pitchFamily="34" charset="0"/>
+            </a:endParaRPr>
+          </a:p>
+          <a:p>
+            <a:pPr>
+              <a:spcAft>
+                <a:spcPts val="1200"/>
+              </a:spcAft>
+            </a:pPr>
+            <a:endParaRPr lang="en-US" dirty="0" smtClean="0">
+              <a:latin typeface="Arial" panose="020B0604020202020204" pitchFamily="34" charset="0"/>
+              <a:cs typeface="Arial" panose="020B0604020202020204" pitchFamily="34" charset="0"/>
+            </a:endParaRPr>
+          </a:p>
+          <a:p>
+            <a:pPr>
+              <a:spcAft>
+                <a:spcPts val="1200"/>
+              </a:spcAft>
+            </a:pPr>
+            <a:endParaRPr lang="en-US" dirty="0">
+              <a:latin typeface="Arial" panose="020B0604020202020204" pitchFamily="34" charset="0"/>
+              <a:cs typeface="Arial" panose="020B0604020202020204" pitchFamily="34" charset="0"/>
+            </a:endParaRPr>
+          </a:p>
+          <a:p>
+            <a:pPr>
+              <a:spcAft>
+                <a:spcPts val="1200"/>
+              </a:spcAft>
+            </a:pPr>
+            <a:endParaRPr lang="en-US" dirty="0" smtClean="0">
+              <a:latin typeface="Arial" panose="020B0604020202020204" pitchFamily="34" charset="0"/>
+              <a:cs typeface="Arial" panose="020B0604020202020204" pitchFamily="34" charset="0"/>
+            </a:endParaRPr>
+          </a:p>
+          <a:p>
+            <a:pPr>
+              <a:spcAft>
+                <a:spcPts val="1200"/>
+              </a:spcAft>
+            </a:pPr>
+            <a:endParaRPr lang="en-US" dirty="0">
+              <a:latin typeface="Arial" panose="020B0604020202020204" pitchFamily="34" charset="0"/>
+              <a:cs typeface="Arial" panose="020B0604020202020204" pitchFamily="34" charset="0"/>
+            </a:endParaRPr>
+          </a:p>
+          <a:p>
+            <a:pPr>
+              <a:spcAft>
+                <a:spcPts val="1200"/>
+              </a:spcAft>
+            </a:pPr>
+            <a:endParaRPr lang="en-US" dirty="0" smtClean="0">
+              <a:latin typeface="Arial" panose="020B0604020202020204" pitchFamily="34" charset="0"/>
+              <a:cs typeface="Arial" panose="020B0604020202020204" pitchFamily="34" charset="0"/>
+            </a:endParaRPr>
+          </a:p>
+          <a:p>
+            <a:pPr>
+              <a:spcAft>
+                <a:spcPts val="1200"/>
+              </a:spcAft>
+            </a:pPr>
+            <a:endParaRPr lang="en-US" dirty="0">
+              <a:latin typeface="Arial" panose="020B0604020202020204" pitchFamily="34" charset="0"/>
+              <a:cs typeface="Arial" panose="020B0604020202020204" pitchFamily="34" charset="0"/>
+            </a:endParaRPr>
+          </a:p>
+          <a:p>
+            <a:pPr>
+              <a:spcAft>
+                <a:spcPts val="1200"/>
+              </a:spcAft>
+            </a:pPr>
+            <a:endParaRPr lang="en-US" dirty="0" smtClean="0">
+              <a:latin typeface="Arial" panose="020B0604020202020204" pitchFamily="34" charset="0"/>
+              <a:cs typeface="Arial" panose="020B0604020202020204" pitchFamily="34" charset="0"/>
+            </a:endParaRPr>
+          </a:p>
+          <a:p>
+            <a:pPr>
+              <a:spcAft>
+                <a:spcPts val="1200"/>
+              </a:spcAft>
+            </a:pPr>
+            <a:endParaRPr lang="en-US" dirty="0">
+              <a:latin typeface="Arial" panose="020B0604020202020204" pitchFamily="34" charset="0"/>
+              <a:cs typeface="Arial" panose="020B0604020202020204" pitchFamily="34" charset="0"/>
+            </a:endParaRPr>
+          </a:p>
+          <a:p>
+            <a:pPr>
+              <a:spcAft>
+                <a:spcPts val="1200"/>
+              </a:spcAft>
+            </a:pPr>
+            <a:endParaRPr lang="en-US" dirty="0" smtClean="0">
+              <a:latin typeface="Arial" panose="020B0604020202020204" pitchFamily="34" charset="0"/>
+              <a:cs typeface="Arial" panose="020B0604020202020204" pitchFamily="34" charset="0"/>
+            </a:endParaRPr>
+          </a:p>
+          <a:p>
+            <a:pPr algn="ctr">
+              <a:spcAft>
+                <a:spcPts val="1200"/>
+              </a:spcAft>
+            </a:pPr>
+            <a:r>
+              <a:rPr lang="en-US" b="1" dirty="0" smtClean="0">
+                <a:latin typeface="Arial" panose="020B0604020202020204" pitchFamily="34" charset="0"/>
+                <a:cs typeface="Arial" panose="020B0604020202020204" pitchFamily="34" charset="0"/>
+              </a:rPr>
+              <a:t>Fig. 2.  Example area containing SP demand </a:t>
+            </a:r>
+            <a:r>
+              <a:rPr lang="en-US" b="1" dirty="0">
+                <a:latin typeface="Arial" panose="020B0604020202020204" pitchFamily="34" charset="0"/>
+                <a:cs typeface="Arial" panose="020B0604020202020204" pitchFamily="34" charset="0"/>
+              </a:rPr>
+              <a:t>p</a:t>
+            </a:r>
+            <a:r>
+              <a:rPr lang="en-US" b="1" dirty="0" smtClean="0">
+                <a:latin typeface="Arial" panose="020B0604020202020204" pitchFamily="34" charset="0"/>
+                <a:cs typeface="Arial" panose="020B0604020202020204" pitchFamily="34" charset="0"/>
+              </a:rPr>
+              <a:t>oints (red) and field (background; SSLT) </a:t>
+            </a:r>
+            <a:r>
+              <a:rPr lang="en-US" b="1" dirty="0" smtClean="0">
+                <a:latin typeface="Arial" panose="020B0604020202020204" pitchFamily="34" charset="0"/>
+                <a:cs typeface="Arial" panose="020B0604020202020204" pitchFamily="34" charset="0"/>
+              </a:rPr>
+              <a:t>and available RP resources (points white, </a:t>
+            </a:r>
+            <a:r>
+              <a:rPr lang="en-US" b="1" dirty="0" err="1" smtClean="0">
+                <a:latin typeface="Arial" panose="020B0604020202020204" pitchFamily="34" charset="0"/>
+                <a:cs typeface="Arial" panose="020B0604020202020204" pitchFamily="34" charset="0"/>
+              </a:rPr>
+              <a:t>Voronoi</a:t>
+            </a:r>
+            <a:r>
+              <a:rPr lang="en-US" b="1" dirty="0" smtClean="0">
+                <a:latin typeface="Arial" panose="020B0604020202020204" pitchFamily="34" charset="0"/>
+                <a:cs typeface="Arial" panose="020B0604020202020204" pitchFamily="34" charset="0"/>
+              </a:rPr>
+              <a:t> tessellation </a:t>
+            </a:r>
+            <a:r>
+              <a:rPr lang="en-US" b="1" dirty="0" smtClean="0">
+                <a:latin typeface="Arial" panose="020B0604020202020204" pitchFamily="34" charset="0"/>
+                <a:cs typeface="Arial" panose="020B0604020202020204" pitchFamily="34" charset="0"/>
+              </a:rPr>
+              <a:t>b</a:t>
+            </a:r>
+            <a:r>
+              <a:rPr lang="en-US" b="1" dirty="0" smtClean="0">
+                <a:latin typeface="Arial" panose="020B0604020202020204" pitchFamily="34" charset="0"/>
+                <a:cs typeface="Arial" panose="020B0604020202020204" pitchFamily="34" charset="0"/>
+              </a:rPr>
+              <a:t>lack; PPP)</a:t>
+            </a:r>
+          </a:p>
+          <a:p>
+            <a:pPr>
+              <a:spcAft>
+                <a:spcPts val="1200"/>
+              </a:spcAft>
+            </a:pPr>
+            <a:r>
+              <a:rPr lang="en-US" dirty="0" smtClean="0">
+                <a:latin typeface="Arial" panose="020B0604020202020204" pitchFamily="34" charset="0"/>
+                <a:cs typeface="Arial" panose="020B0604020202020204" pitchFamily="34" charset="0"/>
+              </a:rPr>
+              <a:t>Consider a geographic area in which a VWN is to be constructed.  A set of base stations (BSs) are available to be rented from the local RPs, each with their own cost, capacity, and coverage range.  A SP has a known continuous demand density field to satisfy, which at any given time is realizable to a set of demand points (DPs) according to the continuous field.</a:t>
+            </a:r>
+          </a:p>
+          <a:p>
+            <a:pPr>
+              <a:spcAft>
+                <a:spcPts val="1200"/>
+              </a:spcAft>
+            </a:pPr>
+            <a:r>
+              <a:rPr lang="en-US" dirty="0" smtClean="0">
+                <a:latin typeface="Arial" panose="020B0604020202020204" pitchFamily="34" charset="0"/>
+                <a:cs typeface="Arial" panose="020B0604020202020204" pitchFamily="34" charset="0"/>
+              </a:rPr>
+              <a:t>The VNB aims to find and select the base stations with minimal cost that, when allocated to the SP demand points, generates maximal demand satisfaction.  This is modeled as a two-stage stochastic optimization model, with homogenous demand points in stochastic locations.  This is not possible to solve directly, so we present two approaches to solve the model that could be run within the VNB.</a:t>
+            </a:r>
+          </a:p>
+          <a:p>
+            <a:pPr>
+              <a:spcAft>
+                <a:spcPts val="1200"/>
+              </a:spcAft>
+            </a:pPr>
+            <a:r>
+              <a:rPr lang="en-US" b="1" dirty="0" smtClean="0">
+                <a:solidFill>
+                  <a:schemeClr val="accent2"/>
+                </a:solidFill>
+                <a:latin typeface="Arial" panose="020B0604020202020204" pitchFamily="34" charset="0"/>
+                <a:cs typeface="Arial" panose="020B0604020202020204" pitchFamily="34" charset="0"/>
+              </a:rPr>
+              <a:t>Sampled Deterministic Equivalent Program (</a:t>
+            </a:r>
+            <a:r>
+              <a:rPr lang="en-US" b="1" dirty="0" err="1" smtClean="0">
+                <a:solidFill>
+                  <a:schemeClr val="accent2"/>
+                </a:solidFill>
+                <a:latin typeface="Arial" panose="020B0604020202020204" pitchFamily="34" charset="0"/>
+                <a:cs typeface="Arial" panose="020B0604020202020204" pitchFamily="34" charset="0"/>
+              </a:rPr>
+              <a:t>sDEP</a:t>
+            </a:r>
+            <a:r>
+              <a:rPr lang="en-US" b="1" dirty="0" smtClean="0">
+                <a:solidFill>
+                  <a:schemeClr val="accent2"/>
+                </a:solidFill>
+                <a:latin typeface="Arial" panose="020B0604020202020204" pitchFamily="34" charset="0"/>
+                <a:cs typeface="Arial" panose="020B0604020202020204" pitchFamily="34" charset="0"/>
+              </a:rPr>
+              <a:t>) Approach:</a:t>
+            </a:r>
+            <a:r>
+              <a:rPr lang="en-US" dirty="0" smtClean="0">
+                <a:solidFill>
+                  <a:schemeClr val="tx1"/>
+                </a:solidFill>
+                <a:latin typeface="Arial" panose="020B0604020202020204" pitchFamily="34" charset="0"/>
+                <a:cs typeface="Arial" panose="020B0604020202020204" pitchFamily="34" charset="0"/>
+              </a:rPr>
+              <a:t>  We convert the stochastic optimization model into a deterministic equivalent program (DEP), which replaces the stochastic variables with deterministic ones.  These are composed of a set containing all scenario realizations of the stochastic variables.  We use a sampling approach to trim the set to a solvable, </a:t>
+            </a:r>
+            <a:r>
+              <a:rPr lang="en-US" dirty="0" smtClean="0">
+                <a:solidFill>
+                  <a:schemeClr val="tx1"/>
+                </a:solidFill>
+                <a:latin typeface="Arial" panose="020B0604020202020204" pitchFamily="34" charset="0"/>
+                <a:cs typeface="Arial" panose="020B0604020202020204" pitchFamily="34" charset="0"/>
+              </a:rPr>
+              <a:t>finite form for a linear solver.</a:t>
+            </a:r>
+            <a:endParaRPr lang="en-US" dirty="0" smtClean="0">
+              <a:solidFill>
+                <a:schemeClr val="tx1"/>
+              </a:solidFill>
+              <a:latin typeface="Arial" panose="020B0604020202020204" pitchFamily="34" charset="0"/>
+              <a:cs typeface="Arial" panose="020B0604020202020204" pitchFamily="34" charset="0"/>
+            </a:endParaRPr>
+          </a:p>
+          <a:p>
+            <a:pPr>
+              <a:spcAft>
+                <a:spcPts val="1200"/>
+              </a:spcAft>
+            </a:pPr>
+            <a:r>
+              <a:rPr lang="en-US" b="1" dirty="0" smtClean="0">
+                <a:solidFill>
+                  <a:schemeClr val="accent2"/>
+                </a:solidFill>
+                <a:latin typeface="Arial" panose="020B0604020202020204" pitchFamily="34" charset="0"/>
+                <a:cs typeface="Arial" panose="020B0604020202020204" pitchFamily="34" charset="0"/>
+              </a:rPr>
+              <a:t>Genetic Algorithm (GA) Approach:</a:t>
+            </a:r>
+            <a:r>
+              <a:rPr lang="en-US" dirty="0">
+                <a:solidFill>
+                  <a:schemeClr val="tx1"/>
+                </a:solidFill>
+                <a:latin typeface="Arial" panose="020B0604020202020204" pitchFamily="34" charset="0"/>
+                <a:cs typeface="Arial" panose="020B0604020202020204" pitchFamily="34" charset="0"/>
+              </a:rPr>
+              <a:t> </a:t>
+            </a:r>
+            <a:r>
+              <a:rPr lang="en-US" dirty="0" smtClean="0">
+                <a:solidFill>
+                  <a:schemeClr val="tx1"/>
+                </a:solidFill>
+                <a:latin typeface="Arial" panose="020B0604020202020204" pitchFamily="34" charset="0"/>
+                <a:cs typeface="Arial" panose="020B0604020202020204" pitchFamily="34" charset="0"/>
+              </a:rPr>
+              <a:t> A major restriction of </a:t>
+            </a:r>
+            <a:r>
+              <a:rPr lang="en-US" dirty="0" err="1" smtClean="0">
+                <a:solidFill>
+                  <a:schemeClr val="tx1"/>
+                </a:solidFill>
+                <a:latin typeface="Arial" panose="020B0604020202020204" pitchFamily="34" charset="0"/>
+                <a:cs typeface="Arial" panose="020B0604020202020204" pitchFamily="34" charset="0"/>
+              </a:rPr>
+              <a:t>sDEP</a:t>
+            </a:r>
+            <a:r>
+              <a:rPr lang="en-US" dirty="0" smtClean="0">
+                <a:solidFill>
+                  <a:schemeClr val="tx1"/>
+                </a:solidFill>
+                <a:latin typeface="Arial" panose="020B0604020202020204" pitchFamily="34" charset="0"/>
+                <a:cs typeface="Arial" panose="020B0604020202020204" pitchFamily="34" charset="0"/>
+              </a:rPr>
+              <a:t> approach is its intractability.  The GA approach attempts to find a tractable approximate solution to the base station selection stage.</a:t>
+            </a:r>
+          </a:p>
+          <a:p>
+            <a:pPr>
+              <a:spcAft>
+                <a:spcPts val="1200"/>
+              </a:spcAft>
+            </a:pPr>
+            <a:endParaRPr lang="en-US" dirty="0">
+              <a:solidFill>
+                <a:schemeClr val="tx1"/>
+              </a:solidFill>
+              <a:latin typeface="Arial" panose="020B0604020202020204" pitchFamily="34" charset="0"/>
+              <a:cs typeface="Arial" panose="020B0604020202020204" pitchFamily="34" charset="0"/>
+            </a:endParaRPr>
+          </a:p>
+          <a:p>
+            <a:pPr>
+              <a:spcAft>
+                <a:spcPts val="1200"/>
+              </a:spcAft>
+            </a:pPr>
+            <a:endParaRPr lang="en-US" dirty="0" smtClean="0">
+              <a:solidFill>
+                <a:schemeClr val="tx1"/>
+              </a:solidFill>
+              <a:latin typeface="Arial" panose="020B0604020202020204" pitchFamily="34" charset="0"/>
+              <a:cs typeface="Arial" panose="020B0604020202020204" pitchFamily="34" charset="0"/>
+            </a:endParaRPr>
+          </a:p>
+          <a:p>
+            <a:pPr>
+              <a:spcAft>
+                <a:spcPts val="1200"/>
+              </a:spcAft>
+            </a:pPr>
+            <a:endParaRPr lang="en-US" dirty="0">
+              <a:solidFill>
+                <a:schemeClr val="tx1"/>
+              </a:solidFill>
+              <a:latin typeface="Arial" panose="020B0604020202020204" pitchFamily="34" charset="0"/>
+              <a:cs typeface="Arial" panose="020B0604020202020204" pitchFamily="34" charset="0"/>
+            </a:endParaRPr>
+          </a:p>
+          <a:p>
+            <a:pPr>
+              <a:spcAft>
+                <a:spcPts val="1200"/>
+              </a:spcAft>
+            </a:pPr>
+            <a:endParaRPr lang="en-US" dirty="0" smtClean="0">
+              <a:solidFill>
+                <a:schemeClr val="tx1"/>
+              </a:solidFill>
+              <a:latin typeface="Arial" panose="020B0604020202020204" pitchFamily="34" charset="0"/>
+              <a:cs typeface="Arial" panose="020B0604020202020204" pitchFamily="34" charset="0"/>
+            </a:endParaRPr>
+          </a:p>
+          <a:p>
+            <a:pPr>
+              <a:spcAft>
+                <a:spcPts val="1200"/>
+              </a:spcAft>
+            </a:pPr>
+            <a:endParaRPr lang="en-US" dirty="0">
+              <a:solidFill>
+                <a:schemeClr val="tx1"/>
+              </a:solidFill>
+              <a:latin typeface="Arial" panose="020B0604020202020204" pitchFamily="34" charset="0"/>
+              <a:cs typeface="Arial" panose="020B0604020202020204" pitchFamily="34" charset="0"/>
+            </a:endParaRPr>
+          </a:p>
+          <a:p>
+            <a:pPr>
+              <a:spcAft>
+                <a:spcPts val="1200"/>
+              </a:spcAft>
+            </a:pPr>
+            <a:endParaRPr lang="en-US" dirty="0" smtClean="0">
+              <a:solidFill>
+                <a:schemeClr val="tx1"/>
+              </a:solidFill>
+              <a:latin typeface="Arial" panose="020B0604020202020204" pitchFamily="34" charset="0"/>
+              <a:cs typeface="Arial" panose="020B0604020202020204" pitchFamily="34" charset="0"/>
+            </a:endParaRPr>
+          </a:p>
+          <a:p>
+            <a:pPr>
+              <a:spcAft>
+                <a:spcPts val="1200"/>
+              </a:spcAft>
+            </a:pPr>
+            <a:endParaRPr lang="en-US" dirty="0">
+              <a:solidFill>
+                <a:schemeClr val="tx1"/>
+              </a:solidFill>
+              <a:latin typeface="Arial" panose="020B0604020202020204" pitchFamily="34" charset="0"/>
+              <a:cs typeface="Arial" panose="020B0604020202020204" pitchFamily="34" charset="0"/>
+            </a:endParaRPr>
+          </a:p>
+          <a:p>
+            <a:pPr>
+              <a:spcAft>
+                <a:spcPts val="1200"/>
+              </a:spcAft>
+            </a:pPr>
+            <a:endParaRPr lang="en-US" dirty="0" smtClean="0">
+              <a:solidFill>
+                <a:schemeClr val="tx1"/>
+              </a:solidFill>
+              <a:latin typeface="Arial" panose="020B0604020202020204" pitchFamily="34" charset="0"/>
+              <a:cs typeface="Arial" panose="020B0604020202020204" pitchFamily="34" charset="0"/>
+            </a:endParaRPr>
+          </a:p>
+          <a:p>
+            <a:pPr>
+              <a:spcAft>
+                <a:spcPts val="1200"/>
+              </a:spcAft>
+            </a:pPr>
+            <a:endParaRPr lang="en-US" dirty="0" smtClean="0">
+              <a:solidFill>
+                <a:schemeClr val="tx1"/>
+              </a:solidFill>
+              <a:latin typeface="Arial" panose="020B0604020202020204" pitchFamily="34" charset="0"/>
+              <a:cs typeface="Arial" panose="020B0604020202020204" pitchFamily="34" charset="0"/>
+            </a:endParaRPr>
+          </a:p>
+          <a:p>
+            <a:pPr>
+              <a:spcAft>
+                <a:spcPts val="1200"/>
+              </a:spcAft>
+            </a:pPr>
+            <a:endParaRPr lang="en-US" dirty="0" smtClean="0">
+              <a:solidFill>
+                <a:schemeClr val="tx1"/>
+              </a:solidFill>
+              <a:latin typeface="Arial" panose="020B0604020202020204" pitchFamily="34" charset="0"/>
+              <a:cs typeface="Arial" panose="020B0604020202020204" pitchFamily="34" charset="0"/>
+            </a:endParaRPr>
+          </a:p>
+          <a:p>
+            <a:pPr algn="ctr">
+              <a:spcAft>
+                <a:spcPts val="1200"/>
+              </a:spcAft>
+            </a:pPr>
+            <a:r>
+              <a:rPr lang="en-US" b="1" dirty="0" smtClean="0">
+                <a:solidFill>
+                  <a:schemeClr val="tx1"/>
+                </a:solidFill>
+                <a:latin typeface="Arial" panose="020B0604020202020204" pitchFamily="34" charset="0"/>
+                <a:cs typeface="Arial" panose="020B0604020202020204" pitchFamily="34" charset="0"/>
+              </a:rPr>
+              <a:t>Fig</a:t>
+            </a:r>
+            <a:r>
+              <a:rPr lang="en-US" b="1" dirty="0">
+                <a:solidFill>
+                  <a:schemeClr val="tx1"/>
+                </a:solidFill>
+                <a:latin typeface="Arial" panose="020B0604020202020204" pitchFamily="34" charset="0"/>
+                <a:cs typeface="Arial" panose="020B0604020202020204" pitchFamily="34" charset="0"/>
+              </a:rPr>
+              <a:t>. 3. Genetic Algorithm </a:t>
+            </a:r>
+            <a:r>
+              <a:rPr lang="en-US" b="1" dirty="0" smtClean="0">
+                <a:solidFill>
+                  <a:schemeClr val="tx1"/>
+                </a:solidFill>
+                <a:latin typeface="Arial" panose="020B0604020202020204" pitchFamily="34" charset="0"/>
+                <a:cs typeface="Arial" panose="020B0604020202020204" pitchFamily="34" charset="0"/>
+              </a:rPr>
+              <a:t>Flowchart</a:t>
+            </a:r>
+            <a:endParaRPr lang="en-US" b="1" dirty="0">
+              <a:solidFill>
+                <a:schemeClr val="tx1"/>
+              </a:solidFill>
+              <a:latin typeface="Arial" panose="020B0604020202020204" pitchFamily="34" charset="0"/>
+              <a:cs typeface="Arial" panose="020B0604020202020204" pitchFamily="34" charset="0"/>
+            </a:endParaRPr>
+          </a:p>
+        </p:txBody>
+      </p:sp>
+      <p:pic>
+        <p:nvPicPr>
+          <p:cNvPr id="15" name="Picture 14"/>
+          <p:cNvPicPr>
+            <a:picLocks noChangeAspect="1"/>
+          </p:cNvPicPr>
+          <p:nvPr/>
+        </p:nvPicPr>
+        <p:blipFill>
+          <a:blip r:embed="rId3">
+            <a:extLst>
+              <a:ext uri="{28A0092B-C50C-407E-A947-70E740481C1C}">
+                <a14:useLocalDpi xmlns:a14="http://schemas.microsoft.com/office/drawing/2010/main" val="0"/>
+              </a:ext>
+            </a:extLst>
+          </a:blip>
+          <a:stretch>
+            <a:fillRect/>
+          </a:stretch>
+        </p:blipFill>
+        <p:spPr>
+          <a:xfrm>
+            <a:off x="11446290" y="26437815"/>
+            <a:ext cx="9207081" cy="5185185"/>
+          </a:xfrm>
+          <a:prstGeom prst="rect">
+            <a:avLst/>
+          </a:prstGeom>
+        </p:spPr>
+      </p:pic>
       <p:grpSp>
         <p:nvGrpSpPr>
           <p:cNvPr id="3074" name="Group 335"/>
@@ -5400,410 +6086,6 @@
       </p:sp>
       <p:sp>
         <p:nvSpPr>
-          <p:cNvPr id="3078" name="Text Box 332"/>
-          <p:cNvSpPr txBox="1">
-            <a:spLocks noChangeArrowheads="1"/>
-          </p:cNvSpPr>
-          <p:nvPr/>
-        </p:nvSpPr>
-        <p:spPr bwMode="auto">
-          <a:xfrm>
-            <a:off x="21299488" y="12459494"/>
-            <a:ext cx="18292763" cy="13503275"/>
-          </a:xfrm>
-          <a:prstGeom prst="rect">
-            <a:avLst/>
-          </a:prstGeom>
-          <a:noFill/>
-          <a:ln>
-            <a:noFill/>
-          </a:ln>
-          <a:effectLst/>
-          <a:extLst>
-            <a:ext uri="{909E8E84-426E-40DD-AFC4-6F175D3DCCD1}">
-              <a14:hiddenFill xmlns:a14="http://schemas.microsoft.com/office/drawing/2010/main">
-                <a:solidFill>
-                  <a:schemeClr val="accent1"/>
-                </a:solidFill>
-              </a14:hiddenFill>
-            </a:ext>
-            <a:ext uri="{91240B29-F687-4F45-9708-019B960494DF}">
-              <a14:hiddenLine xmlns:a14="http://schemas.microsoft.com/office/drawing/2010/main" w="12700">
-                <a:solidFill>
-                  <a:schemeClr val="tx1"/>
-                </a:solidFill>
-                <a:miter lim="800000"/>
-                <a:headEnd type="none" w="sm" len="sm"/>
-                <a:tailEnd type="none" w="sm" len="sm"/>
-              </a14:hiddenLine>
-            </a:ext>
-            <a:ext uri="{AF507438-7753-43E0-B8FC-AC1667EBCBE1}">
-              <a14:hiddenEffects xmlns:a14="http://schemas.microsoft.com/office/drawing/2010/main">
-                <a:effectLst>
-                  <a:outerShdw dist="35921" dir="2700000" algn="ctr" rotWithShape="0">
-                    <a:schemeClr val="bg2"/>
-                  </a:outerShdw>
-                </a:effectLst>
-              </a14:hiddenEffects>
-            </a:ext>
-          </a:extLst>
-        </p:spPr>
-        <p:txBody>
-          <a:bodyPr>
-            <a:spAutoFit/>
-          </a:bodyPr>
-          <a:lstStyle>
-            <a:lvl1pPr>
-              <a:spcBef>
-                <a:spcPct val="20000"/>
-              </a:spcBef>
-              <a:buChar char="•"/>
-              <a:defRPr sz="11000">
-                <a:solidFill>
-                  <a:schemeClr val="tx1"/>
-                </a:solidFill>
-                <a:latin typeface="Times New Roman" panose="02020603050405020304" pitchFamily="18" charset="0"/>
-              </a:defRPr>
-            </a:lvl1pPr>
-            <a:lvl2pPr marL="742950" indent="-285750">
-              <a:spcBef>
-                <a:spcPct val="20000"/>
-              </a:spcBef>
-              <a:buChar char="–"/>
-              <a:defRPr sz="9600">
-                <a:solidFill>
-                  <a:schemeClr val="tx1"/>
-                </a:solidFill>
-                <a:latin typeface="Times New Roman" panose="02020603050405020304" pitchFamily="18" charset="0"/>
-              </a:defRPr>
-            </a:lvl2pPr>
-            <a:lvl3pPr marL="1143000" indent="-228600">
-              <a:spcBef>
-                <a:spcPct val="20000"/>
-              </a:spcBef>
-              <a:buChar char="•"/>
-              <a:defRPr sz="8200">
-                <a:solidFill>
-                  <a:schemeClr val="tx1"/>
-                </a:solidFill>
-                <a:latin typeface="Times New Roman" panose="02020603050405020304" pitchFamily="18" charset="0"/>
-              </a:defRPr>
-            </a:lvl3pPr>
-            <a:lvl4pPr marL="1600200" indent="-228600">
-              <a:spcBef>
-                <a:spcPct val="20000"/>
-              </a:spcBef>
-              <a:buChar char="–"/>
-              <a:defRPr sz="6900">
-                <a:solidFill>
-                  <a:schemeClr val="tx1"/>
-                </a:solidFill>
-                <a:latin typeface="Times New Roman" panose="02020603050405020304" pitchFamily="18" charset="0"/>
-              </a:defRPr>
-            </a:lvl4pPr>
-            <a:lvl5pPr marL="2057400" indent="-228600">
-              <a:spcBef>
-                <a:spcPct val="20000"/>
-              </a:spcBef>
-              <a:buChar char="•"/>
-              <a:defRPr sz="6900">
-                <a:solidFill>
-                  <a:schemeClr val="tx1"/>
-                </a:solidFill>
-                <a:latin typeface="Times New Roman" panose="02020603050405020304" pitchFamily="18" charset="0"/>
-              </a:defRPr>
-            </a:lvl5pPr>
-            <a:lvl6pPr marL="2514600" indent="-228600" eaLnBrk="0" fontAlgn="base" hangingPunct="0">
-              <a:spcBef>
-                <a:spcPct val="20000"/>
-              </a:spcBef>
-              <a:spcAft>
-                <a:spcPct val="0"/>
-              </a:spcAft>
-              <a:buChar char="•"/>
-              <a:defRPr sz="6900">
-                <a:solidFill>
-                  <a:schemeClr val="tx1"/>
-                </a:solidFill>
-                <a:latin typeface="Times New Roman" panose="02020603050405020304" pitchFamily="18" charset="0"/>
-              </a:defRPr>
-            </a:lvl6pPr>
-            <a:lvl7pPr marL="2971800" indent="-228600" eaLnBrk="0" fontAlgn="base" hangingPunct="0">
-              <a:spcBef>
-                <a:spcPct val="20000"/>
-              </a:spcBef>
-              <a:spcAft>
-                <a:spcPct val="0"/>
-              </a:spcAft>
-              <a:buChar char="•"/>
-              <a:defRPr sz="6900">
-                <a:solidFill>
-                  <a:schemeClr val="tx1"/>
-                </a:solidFill>
-                <a:latin typeface="Times New Roman" panose="02020603050405020304" pitchFamily="18" charset="0"/>
-              </a:defRPr>
-            </a:lvl7pPr>
-            <a:lvl8pPr marL="3429000" indent="-228600" eaLnBrk="0" fontAlgn="base" hangingPunct="0">
-              <a:spcBef>
-                <a:spcPct val="20000"/>
-              </a:spcBef>
-              <a:spcAft>
-                <a:spcPct val="0"/>
-              </a:spcAft>
-              <a:buChar char="•"/>
-              <a:defRPr sz="6900">
-                <a:solidFill>
-                  <a:schemeClr val="tx1"/>
-                </a:solidFill>
-                <a:latin typeface="Times New Roman" panose="02020603050405020304" pitchFamily="18" charset="0"/>
-              </a:defRPr>
-            </a:lvl8pPr>
-            <a:lvl9pPr marL="3886200" indent="-228600" eaLnBrk="0" fontAlgn="base" hangingPunct="0">
-              <a:spcBef>
-                <a:spcPct val="20000"/>
-              </a:spcBef>
-              <a:spcAft>
-                <a:spcPct val="0"/>
-              </a:spcAft>
-              <a:buChar char="•"/>
-              <a:defRPr sz="6900">
-                <a:solidFill>
-                  <a:schemeClr val="tx1"/>
-                </a:solidFill>
-                <a:latin typeface="Times New Roman" panose="02020603050405020304" pitchFamily="18" charset="0"/>
-              </a:defRPr>
-            </a:lvl9pPr>
-          </a:lstStyle>
-          <a:p>
-            <a:pPr algn="ctr" eaLnBrk="1" hangingPunct="1">
-              <a:spcBef>
-                <a:spcPct val="0"/>
-              </a:spcBef>
-              <a:buFont typeface="Wingdings" panose="05000000000000000000" pitchFamily="2" charset="2"/>
-              <a:buNone/>
-            </a:pPr>
-            <a:r>
-              <a:rPr lang="en-US" altLang="en-US" sz="4000" dirty="0">
-                <a:latin typeface="Arial" panose="020B0604020202020204" pitchFamily="34" charset="0"/>
-              </a:rPr>
-              <a:t>  </a:t>
-            </a:r>
-            <a:r>
-              <a:rPr lang="en-US" altLang="en-US" sz="4000" b="1" u="sng" dirty="0">
-                <a:latin typeface="Arial" panose="020B0604020202020204" pitchFamily="34" charset="0"/>
-              </a:rPr>
-              <a:t>INSTRUCTIONS</a:t>
-            </a:r>
-            <a:endParaRPr lang="en-US" altLang="en-US" sz="4000" b="1" dirty="0">
-              <a:latin typeface="Arial" panose="020B0604020202020204" pitchFamily="34" charset="0"/>
-            </a:endParaRPr>
-          </a:p>
-          <a:p>
-            <a:pPr eaLnBrk="1" hangingPunct="1">
-              <a:spcBef>
-                <a:spcPct val="0"/>
-              </a:spcBef>
-              <a:buFontTx/>
-              <a:buNone/>
-            </a:pPr>
-            <a:endParaRPr lang="en-US" altLang="en-US" sz="4000" b="1" dirty="0">
-              <a:latin typeface="Arial" panose="020B0604020202020204" pitchFamily="34" charset="0"/>
-            </a:endParaRPr>
-          </a:p>
-          <a:p>
-            <a:pPr eaLnBrk="1" hangingPunct="1">
-              <a:spcBef>
-                <a:spcPct val="0"/>
-              </a:spcBef>
-            </a:pPr>
-            <a:r>
-              <a:rPr lang="en-US" altLang="en-US" sz="4000" dirty="0">
-                <a:latin typeface="Arial" panose="020B0604020202020204" pitchFamily="34" charset="0"/>
-              </a:rPr>
-              <a:t>  Do not alter this template other than moving the line between sponsor and title as needed.</a:t>
-            </a:r>
-          </a:p>
-          <a:p>
-            <a:pPr eaLnBrk="1" hangingPunct="1">
-              <a:spcBef>
-                <a:spcPct val="0"/>
-              </a:spcBef>
-            </a:pPr>
-            <a:endParaRPr lang="en-US" altLang="en-US" sz="4000" dirty="0">
-              <a:latin typeface="Arial" panose="020B0604020202020204" pitchFamily="34" charset="0"/>
-            </a:endParaRPr>
-          </a:p>
-          <a:p>
-            <a:pPr eaLnBrk="1" hangingPunct="1">
-              <a:spcBef>
-                <a:spcPct val="0"/>
-              </a:spcBef>
-            </a:pPr>
-            <a:r>
-              <a:rPr lang="en-US" altLang="en-US" sz="4000" dirty="0">
-                <a:latin typeface="Arial" panose="020B0604020202020204" pitchFamily="34" charset="0"/>
-              </a:rPr>
-              <a:t>  Leave the #XX as it is.  The Poster Team at Virginia Tech will add your poster number before printing your poster.</a:t>
-            </a:r>
-          </a:p>
-          <a:p>
-            <a:pPr eaLnBrk="1" hangingPunct="1">
-              <a:spcBef>
-                <a:spcPct val="0"/>
-              </a:spcBef>
-            </a:pPr>
-            <a:endParaRPr lang="en-US" altLang="en-US" sz="4000" dirty="0">
-              <a:latin typeface="Arial" panose="020B0604020202020204" pitchFamily="34" charset="0"/>
-            </a:endParaRPr>
-          </a:p>
-          <a:p>
-            <a:pPr eaLnBrk="1" hangingPunct="1">
-              <a:spcBef>
-                <a:spcPct val="0"/>
-              </a:spcBef>
-            </a:pPr>
-            <a:r>
-              <a:rPr lang="en-US" altLang="en-US" sz="4000" dirty="0">
-                <a:latin typeface="Arial" panose="020B0604020202020204" pitchFamily="34" charset="0"/>
-              </a:rPr>
-              <a:t>  Use Arial font for all text.</a:t>
-            </a:r>
-          </a:p>
-          <a:p>
-            <a:pPr eaLnBrk="1" hangingPunct="1">
-              <a:spcBef>
-                <a:spcPct val="0"/>
-              </a:spcBef>
-            </a:pPr>
-            <a:endParaRPr lang="en-US" altLang="en-US" sz="4000" dirty="0">
-              <a:latin typeface="Arial" panose="020B0604020202020204" pitchFamily="34" charset="0"/>
-            </a:endParaRPr>
-          </a:p>
-          <a:p>
-            <a:pPr eaLnBrk="1" hangingPunct="1">
-              <a:spcBef>
-                <a:spcPct val="0"/>
-              </a:spcBef>
-            </a:pPr>
-            <a:r>
-              <a:rPr lang="en-US" altLang="en-US" sz="4000" dirty="0">
-                <a:latin typeface="Arial" panose="020B0604020202020204" pitchFamily="34" charset="0"/>
-              </a:rPr>
-              <a:t>  Use only JPEG formatted images</a:t>
-            </a:r>
-          </a:p>
-          <a:p>
-            <a:pPr eaLnBrk="1" hangingPunct="1">
-              <a:spcBef>
-                <a:spcPct val="0"/>
-              </a:spcBef>
-              <a:buFontTx/>
-              <a:buNone/>
-            </a:pPr>
-            <a:r>
-              <a:rPr lang="en-US" altLang="en-US" sz="4000" dirty="0">
-                <a:latin typeface="Arial" panose="020B0604020202020204" pitchFamily="34" charset="0"/>
-              </a:rPr>
-              <a:t>  </a:t>
-            </a:r>
-          </a:p>
-          <a:p>
-            <a:pPr eaLnBrk="1" hangingPunct="1">
-              <a:spcBef>
-                <a:spcPct val="0"/>
-              </a:spcBef>
-            </a:pPr>
-            <a:r>
-              <a:rPr lang="en-US" altLang="en-US" sz="4000" dirty="0">
-                <a:latin typeface="Arial" panose="020B0604020202020204" pitchFamily="34" charset="0"/>
-              </a:rPr>
-              <a:t>  To make your poster more clear, use minimum 24 point font on text, and minimum 16 point font for graphs or axis label.</a:t>
-            </a:r>
-          </a:p>
-          <a:p>
-            <a:pPr eaLnBrk="1" hangingPunct="1">
-              <a:spcBef>
-                <a:spcPct val="0"/>
-              </a:spcBef>
-            </a:pPr>
-            <a:endParaRPr lang="en-US" altLang="en-US" sz="4000" dirty="0">
-              <a:latin typeface="Arial" panose="020B0604020202020204" pitchFamily="34" charset="0"/>
-            </a:endParaRPr>
-          </a:p>
-          <a:p>
-            <a:pPr eaLnBrk="1" hangingPunct="1">
-              <a:spcBef>
-                <a:spcPct val="0"/>
-              </a:spcBef>
-            </a:pPr>
-            <a:r>
-              <a:rPr lang="en-US" altLang="en-US" sz="4000" dirty="0">
-                <a:latin typeface="Arial" panose="020B0604020202020204" pitchFamily="34" charset="0"/>
-              </a:rPr>
-              <a:t>  The poster is supposed to show the key points of your works, not all the details. </a:t>
-            </a:r>
-          </a:p>
-          <a:p>
-            <a:pPr eaLnBrk="1" hangingPunct="1">
-              <a:spcBef>
-                <a:spcPct val="0"/>
-              </a:spcBef>
-            </a:pPr>
-            <a:endParaRPr lang="en-US" altLang="en-US" sz="4000" dirty="0">
-              <a:latin typeface="Arial" panose="020B0604020202020204" pitchFamily="34" charset="0"/>
-            </a:endParaRPr>
-          </a:p>
-          <a:p>
-            <a:pPr eaLnBrk="1" hangingPunct="1">
-              <a:spcBef>
-                <a:spcPct val="0"/>
-              </a:spcBef>
-            </a:pPr>
-            <a:r>
-              <a:rPr lang="en-US" altLang="en-US" sz="4000" dirty="0">
-                <a:latin typeface="Arial" panose="020B0604020202020204" pitchFamily="34" charset="0"/>
-              </a:rPr>
-              <a:t>  Only one poster per file.  If you are doing multiple posters, create one file per poster.</a:t>
-            </a:r>
-          </a:p>
-          <a:p>
-            <a:pPr eaLnBrk="1" hangingPunct="1">
-              <a:spcBef>
-                <a:spcPct val="0"/>
-              </a:spcBef>
-              <a:buFontTx/>
-              <a:buNone/>
-            </a:pPr>
-            <a:endParaRPr lang="en-US" altLang="en-US" sz="4000" dirty="0">
-              <a:latin typeface="Arial" panose="020B0604020202020204" pitchFamily="34" charset="0"/>
-            </a:endParaRPr>
-          </a:p>
-          <a:p>
-            <a:pPr eaLnBrk="1" hangingPunct="1">
-              <a:spcBef>
-                <a:spcPct val="0"/>
-              </a:spcBef>
-            </a:pPr>
-            <a:r>
-              <a:rPr lang="en-US" altLang="en-US" sz="4000" dirty="0">
-                <a:latin typeface="Arial" panose="020B0604020202020204" pitchFamily="34" charset="0"/>
-              </a:rPr>
-              <a:t>The deadline for poster submission is </a:t>
-            </a:r>
-            <a:r>
-              <a:rPr lang="en-US" altLang="en-US" sz="4000" dirty="0">
-                <a:solidFill>
-                  <a:srgbClr val="FF3300"/>
-                </a:solidFill>
-                <a:latin typeface="Arial" panose="020B0604020202020204" pitchFamily="34" charset="0"/>
-              </a:rPr>
-              <a:t>April 13, 2018</a:t>
-            </a:r>
-          </a:p>
-        </p:txBody>
-      </p:sp>
-      <p:sp>
-        <p:nvSpPr>
           <p:cNvPr id="3079" name="Text Box 333"/>
           <p:cNvSpPr txBox="1">
             <a:spLocks noChangeArrowheads="1"/>
@@ -6249,7 +6531,7 @@
           <p:nvPr/>
         </p:nvPicPr>
         <p:blipFill>
-          <a:blip r:embed="rId3">
+          <a:blip r:embed="rId4">
             <a:extLst>
               <a:ext uri="{28A0092B-C50C-407E-A947-70E740481C1C}">
                 <a14:useLocalDpi xmlns:a14="http://schemas.microsoft.com/office/drawing/2010/main" val="0"/>
@@ -6654,7 +6936,7 @@
         <p:spPr>
           <a:xfrm>
             <a:off x="1104900" y="6789738"/>
-            <a:ext cx="19735800" cy="4647426"/>
+            <a:ext cx="9608054" cy="6463308"/>
           </a:xfrm>
           <a:prstGeom prst="rect">
             <a:avLst/>
@@ -6737,8 +7019,19 @@
                 <a:latin typeface="Arial" panose="020B0604020202020204" pitchFamily="34" charset="0"/>
                 <a:cs typeface="Arial" panose="020B0604020202020204" pitchFamily="34" charset="0"/>
               </a:rPr>
-              <a:t>) paradigm, which introduces a service-oriented concept as a natural motivation for virtualization in mobile wireless networks (MWNs).  We model base station selection and adaptive slicing in the virtual network builder (VNB) as a stochastic optimization problem.  We then present two approaches to finding the solution, one based on a sampled deterministic equivalent program and another based on a genetic algorithm metaheuristic.</a:t>
-            </a:r>
+              <a:t>) paradigm, which introduces a service-oriented concept as a natural motivation for virtualization in mobile wireless networks (</a:t>
+            </a:r>
+            <a:r>
+              <a:rPr lang="en-US" dirty="0" smtClean="0">
+                <a:latin typeface="Arial" panose="020B0604020202020204" pitchFamily="34" charset="0"/>
+                <a:cs typeface="Arial" panose="020B0604020202020204" pitchFamily="34" charset="0"/>
+              </a:rPr>
+              <a:t>MWNs).</a:t>
+            </a:r>
+            <a:endParaRPr lang="en-US" dirty="0" smtClean="0">
+              <a:latin typeface="Arial" panose="020B0604020202020204" pitchFamily="34" charset="0"/>
+              <a:cs typeface="Arial" panose="020B0604020202020204" pitchFamily="34" charset="0"/>
+            </a:endParaRPr>
           </a:p>
         </p:txBody>
       </p:sp>
@@ -6750,8 +7043,8 @@
         </p:nvSpPr>
         <p:spPr>
           <a:xfrm>
-            <a:off x="1104900" y="11930876"/>
-            <a:ext cx="9608054" cy="10895290"/>
+            <a:off x="1104898" y="13746758"/>
+            <a:ext cx="9608054" cy="10156627"/>
           </a:xfrm>
           <a:prstGeom prst="rect">
             <a:avLst/>
@@ -6938,7 +7231,27 @@
                 <a:latin typeface="Arial" panose="020B0604020202020204" pitchFamily="34" charset="0"/>
                 <a:cs typeface="Arial" panose="020B0604020202020204" pitchFamily="34" charset="0"/>
               </a:rPr>
-              <a:t> devices), or any of the present over-the-top services.</a:t>
+              <a:t> devices), or any </a:t>
+            </a:r>
+            <a:r>
+              <a:rPr lang="en-US" dirty="0" smtClean="0">
+                <a:solidFill>
+                  <a:schemeClr val="tx1"/>
+                </a:solidFill>
+                <a:latin typeface="Arial" panose="020B0604020202020204" pitchFamily="34" charset="0"/>
+                <a:cs typeface="Arial" panose="020B0604020202020204" pitchFamily="34" charset="0"/>
+              </a:rPr>
+              <a:t>other over-the-top </a:t>
+            </a:r>
+            <a:r>
+              <a:rPr lang="en-US" dirty="0" smtClean="0">
+                <a:solidFill>
+                  <a:schemeClr val="tx1"/>
+                </a:solidFill>
+                <a:latin typeface="Arial" panose="020B0604020202020204" pitchFamily="34" charset="0"/>
+                <a:cs typeface="Arial" panose="020B0604020202020204" pitchFamily="34" charset="0"/>
+              </a:rPr>
+              <a:t>services.</a:t>
             </a:r>
           </a:p>
           <a:p>
@@ -6965,7 +7278,27 @@
                 <a:latin typeface="Arial" panose="020B0604020202020204" pitchFamily="34" charset="0"/>
                 <a:cs typeface="Arial" panose="020B0604020202020204" pitchFamily="34" charset="0"/>
               </a:rPr>
-              <a:t>  Consists of a Virtual Network Architect and Network Aggregator.  It composes and aggregates the virtual resources from the resource providers (RPs) to build virtual networks for the SPs.</a:t>
+              <a:t>  Consists of a Virtual Network </a:t>
+            </a:r>
+            <a:r>
+              <a:rPr lang="en-US" dirty="0" smtClean="0">
+                <a:solidFill>
+                  <a:schemeClr val="tx1"/>
+                </a:solidFill>
+                <a:latin typeface="Arial" panose="020B0604020202020204" pitchFamily="34" charset="0"/>
+                <a:cs typeface="Arial" panose="020B0604020202020204" pitchFamily="34" charset="0"/>
+              </a:rPr>
+              <a:t>Architect.  </a:t>
+            </a:r>
+            <a:r>
+              <a:rPr lang="en-US" dirty="0" smtClean="0">
+                <a:solidFill>
+                  <a:schemeClr val="tx1"/>
+                </a:solidFill>
+                <a:latin typeface="Arial" panose="020B0604020202020204" pitchFamily="34" charset="0"/>
+                <a:cs typeface="Arial" panose="020B0604020202020204" pitchFamily="34" charset="0"/>
+              </a:rPr>
+              <a:t>It composes and aggregates the virtual resources from the resource providers (RPs) to build virtual networks for the SPs.</a:t>
             </a:r>
           </a:p>
           <a:p>
@@ -6992,35 +7325,31 @@
                 <a:latin typeface="Arial" panose="020B0604020202020204" pitchFamily="34" charset="0"/>
                 <a:cs typeface="Arial" panose="020B0604020202020204" pitchFamily="34" charset="0"/>
               </a:rPr>
-              <a:t>  The owner of a set of resources that can be offered as virtual resources in a set of pools, according to contracts established with VNBs, for example.  In general, an RP will define how to slice and share its resources as virtual ones.</a:t>
+              <a:t>  The owner of a set of resources that can be offered as virtual resources in a set of pools, according to contracts established with </a:t>
+            </a:r>
+            <a:r>
+              <a:rPr lang="en-US" dirty="0" smtClean="0">
+                <a:solidFill>
+                  <a:schemeClr val="tx1"/>
+                </a:solidFill>
+                <a:latin typeface="Arial" panose="020B0604020202020204" pitchFamily="34" charset="0"/>
+                <a:cs typeface="Arial" panose="020B0604020202020204" pitchFamily="34" charset="0"/>
+              </a:rPr>
+              <a:t>VNBs or NAs, </a:t>
+            </a:r>
+            <a:r>
+              <a:rPr lang="en-US" dirty="0" smtClean="0">
+                <a:solidFill>
+                  <a:schemeClr val="tx1"/>
+                </a:solidFill>
+                <a:latin typeface="Arial" panose="020B0604020202020204" pitchFamily="34" charset="0"/>
+                <a:cs typeface="Arial" panose="020B0604020202020204" pitchFamily="34" charset="0"/>
+              </a:rPr>
+              <a:t>for example.  In general, an RP will define how to slice and share its resources as virtual ones.</a:t>
             </a:r>
           </a:p>
         </p:txBody>
       </p:sp>
-      <p:pic>
-        <p:nvPicPr>
-          <p:cNvPr id="5" name="Picture 4"/>
-          <p:cNvPicPr>
-            <a:picLocks noChangeAspect="1"/>
-          </p:cNvPicPr>
-          <p:nvPr/>
-        </p:nvPicPr>
-        <p:blipFill>
-          <a:blip r:embed="rId4"/>
-          <a:stretch>
-            <a:fillRect/>
-          </a:stretch>
-        </p:blipFill>
-        <p:spPr>
-          <a:xfrm>
-            <a:off x="1305285" y="12794456"/>
-            <a:ext cx="9220345" cy="4023949"/>
-          </a:xfrm>
-          <a:prstGeom prst="rect">
-            <a:avLst/>
-          </a:prstGeom>
-        </p:spPr>
-      </p:pic>
       <p:sp>
         <p:nvSpPr>
           <p:cNvPr id="6" name="TextBox 5"/>
@@ -7029,7 +7358,7 @@
         </p:nvSpPr>
         <p:spPr>
           <a:xfrm>
-            <a:off x="1104900" y="16949834"/>
+            <a:off x="1104898" y="18765716"/>
             <a:ext cx="9608054" cy="461665"/>
           </a:xfrm>
           <a:prstGeom prst="rect">
@@ -7052,16 +7381,76 @@
           </a:p>
         </p:txBody>
       </p:sp>
+      <p:pic>
+        <p:nvPicPr>
+          <p:cNvPr id="4" name="Picture 3"/>
+          <p:cNvPicPr>
+            <a:picLocks noChangeAspect="1"/>
+          </p:cNvPicPr>
+          <p:nvPr/>
+        </p:nvPicPr>
+        <p:blipFill>
+          <a:blip r:embed="rId5">
+            <a:extLst>
+              <a:ext uri="{28A0092B-C50C-407E-A947-70E740481C1C}">
+                <a14:useLocalDpi xmlns:a14="http://schemas.microsoft.com/office/drawing/2010/main" val="0"/>
+              </a:ext>
+            </a:extLst>
+          </a:blip>
+          <a:stretch>
+            <a:fillRect/>
+          </a:stretch>
+        </p:blipFill>
+        <p:spPr>
+          <a:xfrm>
+            <a:off x="1298752" y="14741766"/>
+            <a:ext cx="9220345" cy="4023950"/>
+          </a:xfrm>
+          <a:prstGeom prst="rect">
+            <a:avLst/>
+          </a:prstGeom>
+        </p:spPr>
+      </p:pic>
+      <p:pic>
+        <p:nvPicPr>
+          <p:cNvPr id="10" name="Picture 9"/>
+          <p:cNvPicPr>
+            <a:picLocks noChangeAspect="1"/>
+          </p:cNvPicPr>
+          <p:nvPr/>
+        </p:nvPicPr>
+        <p:blipFill>
+          <a:blip r:embed="rId6">
+            <a:extLst>
+              <a:ext uri="{28A0092B-C50C-407E-A947-70E740481C1C}">
+                <a14:useLocalDpi xmlns:a14="http://schemas.microsoft.com/office/drawing/2010/main" val="0"/>
+              </a:ext>
+            </a:extLst>
+          </a:blip>
+          <a:stretch>
+            <a:fillRect/>
+          </a:stretch>
+        </p:blipFill>
+        <p:spPr>
+          <a:xfrm>
+            <a:off x="11446290" y="7489776"/>
+            <a:ext cx="9207081" cy="9192396"/>
+          </a:xfrm>
+          <a:prstGeom prst="rect">
+            <a:avLst/>
+          </a:prstGeom>
+        </p:spPr>
+      </p:pic>
       <p:sp>
         <p:nvSpPr>
-          <p:cNvPr id="7" name="TextBox 6"/>
+          <p:cNvPr id="14" name="TextBox 13"/>
           <p:cNvSpPr txBox="1"/>
           <p:nvPr/>
         </p:nvSpPr>
         <p:spPr>
           <a:xfrm>
-            <a:off x="11171742" y="11930876"/>
-            <a:ext cx="9668958" cy="984885"/>
+            <a:off x="1104898" y="24216852"/>
+            <a:ext cx="9608054" cy="8217634"/>
           </a:xfrm>
           <a:prstGeom prst="rect">
             <a:avLst/>
@@ -7087,25 +7476,323 @@
           </a:bodyPr>
           <a:lstStyle/>
           <a:p>
-            <a:pPr algn="ctr"/>
+            <a:pPr algn="ctr">
+              <a:spcAft>
+                <a:spcPts val="1200"/>
+              </a:spcAft>
+            </a:pPr>
             <a:r>
               <a:rPr lang="en-US" sz="3400" b="1" dirty="0" smtClean="0">
                 <a:solidFill>
                   <a:srgbClr val="FF0000"/>
                 </a:solidFill>
+                <a:latin typeface="Arial" panose="020B0604020202020204" pitchFamily="34" charset="0"/>
+                <a:cs typeface="Arial" panose="020B0604020202020204" pitchFamily="34" charset="0"/>
               </a:rPr>
-              <a:t>III. VWN Construction</a:t>
-            </a:r>
-          </a:p>
-          <a:p>
-            <a:r>
-              <a:rPr lang="en-US" dirty="0" smtClean="0"/>
-              <a:t>Placeholder text</a:t>
-            </a:r>
-            <a:endParaRPr lang="en-US" sz="4400" b="1" dirty="0"/>
+              <a:t>IV. Results</a:t>
+            </a:r>
+          </a:p>
+          <a:p>
+            <a:pPr>
+              <a:spcAft>
+                <a:spcPts val="1200"/>
+              </a:spcAft>
+            </a:pPr>
+            <a:endParaRPr lang="en-US" dirty="0" smtClean="0">
+              <a:latin typeface="Arial" panose="020B0604020202020204" pitchFamily="34" charset="0"/>
+              <a:cs typeface="Arial" panose="020B0604020202020204" pitchFamily="34" charset="0"/>
+            </a:endParaRPr>
+          </a:p>
+          <a:p>
+            <a:pPr>
+              <a:spcAft>
+                <a:spcPts val="1200"/>
+              </a:spcAft>
+            </a:pPr>
+            <a:endParaRPr lang="en-US" dirty="0">
+              <a:latin typeface="Arial" panose="020B0604020202020204" pitchFamily="34" charset="0"/>
+              <a:cs typeface="Arial" panose="020B0604020202020204" pitchFamily="34" charset="0"/>
+            </a:endParaRPr>
+          </a:p>
+          <a:p>
+            <a:pPr>
+              <a:spcAft>
+                <a:spcPts val="1200"/>
+              </a:spcAft>
+            </a:pPr>
+            <a:endParaRPr lang="en-US" dirty="0" smtClean="0">
+              <a:latin typeface="Arial" panose="020B0604020202020204" pitchFamily="34" charset="0"/>
+              <a:cs typeface="Arial" panose="020B0604020202020204" pitchFamily="34" charset="0"/>
+            </a:endParaRPr>
+          </a:p>
+          <a:p>
+            <a:pPr>
+              <a:spcAft>
+                <a:spcPts val="1200"/>
+              </a:spcAft>
+            </a:pPr>
+            <a:endParaRPr lang="en-US" dirty="0">
+              <a:latin typeface="Arial" panose="020B0604020202020204" pitchFamily="34" charset="0"/>
+              <a:cs typeface="Arial" panose="020B0604020202020204" pitchFamily="34" charset="0"/>
+            </a:endParaRPr>
+          </a:p>
+          <a:p>
+            <a:pPr>
+              <a:spcAft>
+                <a:spcPts val="1200"/>
+              </a:spcAft>
+            </a:pPr>
+            <a:endParaRPr lang="en-US" dirty="0" smtClean="0">
+              <a:latin typeface="Arial" panose="020B0604020202020204" pitchFamily="34" charset="0"/>
+              <a:cs typeface="Arial" panose="020B0604020202020204" pitchFamily="34" charset="0"/>
+            </a:endParaRPr>
+          </a:p>
+          <a:p>
+            <a:pPr>
+              <a:spcAft>
+                <a:spcPts val="1200"/>
+              </a:spcAft>
+            </a:pPr>
+            <a:endParaRPr lang="en-US" dirty="0">
+              <a:latin typeface="Arial" panose="020B0604020202020204" pitchFamily="34" charset="0"/>
+              <a:cs typeface="Arial" panose="020B0604020202020204" pitchFamily="34" charset="0"/>
+            </a:endParaRPr>
+          </a:p>
+          <a:p>
+            <a:pPr>
+              <a:spcAft>
+                <a:spcPts val="1200"/>
+              </a:spcAft>
+            </a:pPr>
+            <a:endParaRPr lang="en-US" dirty="0" smtClean="0">
+              <a:latin typeface="Arial" panose="020B0604020202020204" pitchFamily="34" charset="0"/>
+              <a:cs typeface="Arial" panose="020B0604020202020204" pitchFamily="34" charset="0"/>
+            </a:endParaRPr>
+          </a:p>
+          <a:p>
+            <a:pPr>
+              <a:spcAft>
+                <a:spcPts val="1200"/>
+              </a:spcAft>
+            </a:pPr>
+            <a:endParaRPr lang="en-US" dirty="0">
+              <a:latin typeface="Arial" panose="020B0604020202020204" pitchFamily="34" charset="0"/>
+              <a:cs typeface="Arial" panose="020B0604020202020204" pitchFamily="34" charset="0"/>
+            </a:endParaRPr>
+          </a:p>
+          <a:p>
+            <a:pPr>
+              <a:spcAft>
+                <a:spcPts val="1200"/>
+              </a:spcAft>
+            </a:pPr>
+            <a:endParaRPr lang="en-US" dirty="0">
+              <a:latin typeface="Arial" panose="020B0604020202020204" pitchFamily="34" charset="0"/>
+              <a:cs typeface="Arial" panose="020B0604020202020204" pitchFamily="34" charset="0"/>
+            </a:endParaRPr>
+          </a:p>
+          <a:p>
+            <a:pPr algn="ctr">
+              <a:spcAft>
+                <a:spcPts val="1200"/>
+              </a:spcAft>
+            </a:pPr>
+            <a:r>
+              <a:rPr lang="en-US" b="1" dirty="0" smtClean="0">
+                <a:latin typeface="Arial" panose="020B0604020202020204" pitchFamily="34" charset="0"/>
+                <a:cs typeface="Arial" panose="020B0604020202020204" pitchFamily="34" charset="0"/>
+              </a:rPr>
+              <a:t>Fig. 4.  CPU Runtime and BS Costs of </a:t>
+            </a:r>
+            <a:r>
+              <a:rPr lang="en-US" b="1" dirty="0" err="1" smtClean="0">
+                <a:latin typeface="Arial" panose="020B0604020202020204" pitchFamily="34" charset="0"/>
+                <a:cs typeface="Arial" panose="020B0604020202020204" pitchFamily="34" charset="0"/>
+              </a:rPr>
+              <a:t>sDEP</a:t>
+            </a:r>
+            <a:r>
+              <a:rPr lang="en-US" b="1" dirty="0">
+                <a:latin typeface="Arial" panose="020B0604020202020204" pitchFamily="34" charset="0"/>
+                <a:cs typeface="Arial" panose="020B0604020202020204" pitchFamily="34" charset="0"/>
+              </a:rPr>
+              <a:t>,</a:t>
+            </a:r>
+            <a:r>
+              <a:rPr lang="en-US" b="1" dirty="0" smtClean="0">
+                <a:latin typeface="Arial" panose="020B0604020202020204" pitchFamily="34" charset="0"/>
+                <a:cs typeface="Arial" panose="020B0604020202020204" pitchFamily="34" charset="0"/>
+              </a:rPr>
+              <a:t> GA Approaches</a:t>
+            </a:r>
+          </a:p>
+          <a:p>
+            <a:pPr marL="342900" indent="-342900">
+              <a:buFont typeface="Arial" panose="020B0604020202020204" pitchFamily="34" charset="0"/>
+              <a:buChar char="•"/>
+            </a:pPr>
+            <a:r>
+              <a:rPr lang="en-US" dirty="0" smtClean="0">
+                <a:latin typeface="Arial" panose="020B0604020202020204" pitchFamily="34" charset="0"/>
+                <a:cs typeface="Arial" panose="020B0604020202020204" pitchFamily="34" charset="0"/>
+              </a:rPr>
+              <a:t>GA runs in appx. 2% (</a:t>
+            </a:r>
+            <a:r>
+              <a:rPr lang="el-GR" dirty="0" smtClean="0">
+                <a:latin typeface="Arial" panose="020B0604020202020204" pitchFamily="34" charset="0"/>
+                <a:cs typeface="Arial" panose="020B0604020202020204" pitchFamily="34" charset="0"/>
+              </a:rPr>
+              <a:t>α</a:t>
+            </a:r>
+            <a:r>
+              <a:rPr lang="en-US" dirty="0" smtClean="0">
+                <a:latin typeface="Arial" panose="020B0604020202020204" pitchFamily="34" charset="0"/>
+                <a:cs typeface="Arial" panose="020B0604020202020204" pitchFamily="34" charset="0"/>
+              </a:rPr>
+              <a:t> = {20, 25}) to 13% (</a:t>
+            </a:r>
+            <a:r>
+              <a:rPr lang="el-GR" dirty="0" smtClean="0">
+                <a:latin typeface="Arial" panose="020B0604020202020204" pitchFamily="34" charset="0"/>
+                <a:cs typeface="Arial" panose="020B0604020202020204" pitchFamily="34" charset="0"/>
+              </a:rPr>
+              <a:t>α</a:t>
+            </a:r>
+            <a:r>
+              <a:rPr lang="en-US" dirty="0" smtClean="0">
+                <a:latin typeface="Arial" panose="020B0604020202020204" pitchFamily="34" charset="0"/>
+                <a:cs typeface="Arial" panose="020B0604020202020204" pitchFamily="34" charset="0"/>
+              </a:rPr>
+              <a:t> ≥ 30) of the time</a:t>
+            </a:r>
+          </a:p>
+          <a:p>
+            <a:pPr marL="342900" indent="-342900">
+              <a:buFont typeface="Arial" panose="020B0604020202020204" pitchFamily="34" charset="0"/>
+              <a:buChar char="•"/>
+            </a:pPr>
+            <a:r>
+              <a:rPr lang="en-US" dirty="0" smtClean="0">
+                <a:latin typeface="Arial" panose="020B0604020202020204" pitchFamily="34" charset="0"/>
+                <a:cs typeface="Arial" panose="020B0604020202020204" pitchFamily="34" charset="0"/>
+              </a:rPr>
+              <a:t>GA incurs appx. 20% (2 BSs) additional cost compared to </a:t>
+            </a:r>
+            <a:r>
+              <a:rPr lang="en-US" dirty="0" err="1" smtClean="0">
+                <a:latin typeface="Arial" panose="020B0604020202020204" pitchFamily="34" charset="0"/>
+                <a:cs typeface="Arial" panose="020B0604020202020204" pitchFamily="34" charset="0"/>
+              </a:rPr>
+              <a:t>sDEP</a:t>
+            </a:r>
+            <a:endParaRPr lang="en-US" dirty="0" smtClean="0">
+              <a:latin typeface="Arial" panose="020B0604020202020204" pitchFamily="34" charset="0"/>
+              <a:cs typeface="Arial" panose="020B0604020202020204" pitchFamily="34" charset="0"/>
+            </a:endParaRPr>
+          </a:p>
+          <a:p>
+            <a:pPr marL="342900" indent="-342900">
+              <a:buFont typeface="Arial" panose="020B0604020202020204" pitchFamily="34" charset="0"/>
+              <a:buChar char="•"/>
+            </a:pPr>
+            <a:r>
+              <a:rPr lang="en-US" dirty="0" smtClean="0">
+                <a:latin typeface="Arial" panose="020B0604020202020204" pitchFamily="34" charset="0"/>
+                <a:cs typeface="Arial" panose="020B0604020202020204" pitchFamily="34" charset="0"/>
+              </a:rPr>
+              <a:t>(Not shown) Due to increased selection, GA has improved demand satisfaction (&gt;99.99%) compared to </a:t>
+            </a:r>
+            <a:r>
+              <a:rPr lang="en-US" dirty="0" err="1" smtClean="0">
+                <a:latin typeface="Arial" panose="020B0604020202020204" pitchFamily="34" charset="0"/>
+                <a:cs typeface="Arial" panose="020B0604020202020204" pitchFamily="34" charset="0"/>
+              </a:rPr>
+              <a:t>sDEP</a:t>
+            </a:r>
+            <a:r>
+              <a:rPr lang="en-US" dirty="0" smtClean="0">
+                <a:latin typeface="Arial" panose="020B0604020202020204" pitchFamily="34" charset="0"/>
+                <a:cs typeface="Arial" panose="020B0604020202020204" pitchFamily="34" charset="0"/>
+              </a:rPr>
+              <a:t> (99.0%)</a:t>
+            </a:r>
+          </a:p>
+          <a:p>
+            <a:pPr marL="342900" indent="-342900">
+              <a:buFont typeface="Arial" panose="020B0604020202020204" pitchFamily="34" charset="0"/>
+              <a:buChar char="•"/>
+            </a:pPr>
+            <a:r>
+              <a:rPr lang="en-US" dirty="0" smtClean="0">
+                <a:latin typeface="Arial" panose="020B0604020202020204" pitchFamily="34" charset="0"/>
+                <a:cs typeface="Arial" panose="020B0604020202020204" pitchFamily="34" charset="0"/>
+              </a:rPr>
+              <a:t>GA is more tractable; may incur less comparative cost with larger (higher resolution) data sets.</a:t>
+            </a:r>
           </a:p>
         </p:txBody>
       </p:sp>
+      <p:pic>
+        <p:nvPicPr>
+          <p:cNvPr id="16" name="Picture 15"/>
+          <p:cNvPicPr>
+            <a:picLocks noChangeAspect="1"/>
+          </p:cNvPicPr>
+          <p:nvPr/>
+        </p:nvPicPr>
+        <p:blipFill>
+          <a:blip r:embed="rId7">
+            <a:extLst>
+              <a:ext uri="{28A0092B-C50C-407E-A947-70E740481C1C}">
+                <a14:useLocalDpi xmlns:a14="http://schemas.microsoft.com/office/drawing/2010/main" val="0"/>
+              </a:ext>
+            </a:extLst>
+          </a:blip>
+          <a:stretch>
+            <a:fillRect/>
+          </a:stretch>
+        </p:blipFill>
+        <p:spPr>
+          <a:xfrm>
+            <a:off x="1756024" y="24736596"/>
+            <a:ext cx="8305800" cy="2390604"/>
+          </a:xfrm>
+          <a:prstGeom prst="rect">
+            <a:avLst/>
+          </a:prstGeom>
+        </p:spPr>
+      </p:pic>
+      <p:pic>
+        <p:nvPicPr>
+          <p:cNvPr id="17" name="Picture 16"/>
+          <p:cNvPicPr>
+            <a:picLocks noChangeAspect="1"/>
+          </p:cNvPicPr>
+          <p:nvPr/>
+        </p:nvPicPr>
+        <p:blipFill>
+          <a:blip r:embed="rId8">
+            <a:extLst>
+              <a:ext uri="{28A0092B-C50C-407E-A947-70E740481C1C}">
+                <a14:useLocalDpi xmlns:a14="http://schemas.microsoft.com/office/drawing/2010/main" val="0"/>
+              </a:ext>
+            </a:extLst>
+          </a:blip>
+          <a:stretch>
+            <a:fillRect/>
+          </a:stretch>
+        </p:blipFill>
+        <p:spPr>
+          <a:xfrm>
+            <a:off x="1524001" y="27111499"/>
+            <a:ext cx="8537823" cy="2549351"/>
+          </a:xfrm>
+          <a:prstGeom prst="rect">
+            <a:avLst/>
+          </a:prstGeom>
+        </p:spPr>
+      </p:pic>
     </p:spTree>
   </p:cSld>
   <p:clrMapOvr>

</xml_diff>

<commit_message>
Updated format; Need to alter section IV
</commit_message>
<xml_diff>
--- a/Other/Poster_2018Wireless_BSSelVWN.pptx
+++ b/Other/Poster_2018Wireless_BSSelVWN.pptx
@@ -4244,7 +4244,7 @@
         <p:spPr>
           <a:xfrm>
             <a:off x="11171737" y="6789738"/>
-            <a:ext cx="9668958" cy="25453122"/>
+            <a:ext cx="9668958" cy="14527054"/>
           </a:xfrm>
           <a:prstGeom prst="rect">
             <a:avLst/>
@@ -4292,10 +4292,28 @@
                 <a:spcPts val="1200"/>
               </a:spcAft>
             </a:pPr>
-            <a:endParaRPr lang="en-US" sz="3400" b="1" dirty="0">
-              <a:solidFill>
-                <a:srgbClr val="FF0000"/>
-              </a:solidFill>
+            <a:r>
+              <a:rPr lang="en-US" dirty="0" smtClean="0">
+                <a:latin typeface="Arial" panose="020B0604020202020204" pitchFamily="34" charset="0"/>
+                <a:cs typeface="Arial" panose="020B0604020202020204" pitchFamily="34" charset="0"/>
+              </a:rPr>
+              <a:t>Consider </a:t>
+            </a:r>
+            <a:r>
+              <a:rPr lang="en-US" dirty="0" smtClean="0">
+                <a:latin typeface="Arial" panose="020B0604020202020204" pitchFamily="34" charset="0"/>
+                <a:cs typeface="Arial" panose="020B0604020202020204" pitchFamily="34" charset="0"/>
+              </a:rPr>
+              <a:t>a geographic area in which a VWN is to be constructed.  A set of base stations (BSs) are available to be rented from the local RPs, each with their own cost, capacity, and coverage range.  A SP has a known continuous demand density field to satisfy, which at any given time is realizable to a set of demand points (DPs</a:t>
+            </a:r>
+            <a:r>
+              <a:rPr lang="en-US" dirty="0" smtClean="0">
+                <a:latin typeface="Arial" panose="020B0604020202020204" pitchFamily="34" charset="0"/>
+                <a:cs typeface="Arial" panose="020B0604020202020204" pitchFamily="34" charset="0"/>
+              </a:rPr>
+              <a:t>).</a:t>
+            </a:r>
+            <a:endParaRPr lang="en-US" dirty="0" smtClean="0">
               <a:latin typeface="Arial" panose="020B0604020202020204" pitchFamily="34" charset="0"/>
               <a:cs typeface="Arial" panose="020B0604020202020204" pitchFamily="34" charset="0"/>
             </a:endParaRPr>
@@ -4306,13 +4324,13 @@
                 <a:spcPts val="1200"/>
               </a:spcAft>
             </a:pPr>
-            <a:endParaRPr lang="en-US" sz="3400" b="1" dirty="0" smtClean="0">
-              <a:solidFill>
-                <a:srgbClr val="FF0000"/>
-              </a:solidFill>
-              <a:latin typeface="Arial" panose="020B0604020202020204" pitchFamily="34" charset="0"/>
-              <a:cs typeface="Arial" panose="020B0604020202020204" pitchFamily="34" charset="0"/>
-            </a:endParaRPr>
+            <a:r>
+              <a:rPr lang="en-US" dirty="0" smtClean="0">
+                <a:latin typeface="Arial" panose="020B0604020202020204" pitchFamily="34" charset="0"/>
+                <a:cs typeface="Arial" panose="020B0604020202020204" pitchFamily="34" charset="0"/>
+              </a:rPr>
+              <a:t>The VNB aims to find and select the base stations with minimal cost that, when allocated to the SP demand points, generates maximal demand satisfaction.  This is modeled as a two-stage stochastic optimization model, with homogenous demand points in stochastic locations.  This is not possible to solve directly, so we present two approaches to solve the model that could be run within the VNB.</a:t>
+            </a:r>
           </a:p>
           <a:p>
             <a:pPr>
@@ -4320,13 +4338,46 @@
                 <a:spcPts val="1200"/>
               </a:spcAft>
             </a:pPr>
-            <a:endParaRPr lang="en-US" sz="3400" b="1" dirty="0">
-              <a:solidFill>
-                <a:srgbClr val="FF0000"/>
-              </a:solidFill>
-              <a:latin typeface="Arial" panose="020B0604020202020204" pitchFamily="34" charset="0"/>
-              <a:cs typeface="Arial" panose="020B0604020202020204" pitchFamily="34" charset="0"/>
-            </a:endParaRPr>
+            <a:r>
+              <a:rPr lang="en-US" b="1" dirty="0" smtClean="0">
+                <a:solidFill>
+                  <a:schemeClr val="accent2"/>
+                </a:solidFill>
+                <a:latin typeface="Arial" panose="020B0604020202020204" pitchFamily="34" charset="0"/>
+                <a:cs typeface="Arial" panose="020B0604020202020204" pitchFamily="34" charset="0"/>
+              </a:rPr>
+              <a:t>Sampled Deterministic Equivalent Program (</a:t>
+            </a:r>
+            <a:r>
+              <a:rPr lang="en-US" b="1" dirty="0" err="1" smtClean="0">
+                <a:solidFill>
+                  <a:schemeClr val="accent2"/>
+                </a:solidFill>
+                <a:latin typeface="Arial" panose="020B0604020202020204" pitchFamily="34" charset="0"/>
+                <a:cs typeface="Arial" panose="020B0604020202020204" pitchFamily="34" charset="0"/>
+              </a:rPr>
+              <a:t>sDEP</a:t>
+            </a:r>
+            <a:r>
+              <a:rPr lang="en-US" b="1" dirty="0" smtClean="0">
+                <a:solidFill>
+                  <a:schemeClr val="accent2"/>
+                </a:solidFill>
+                <a:latin typeface="Arial" panose="020B0604020202020204" pitchFamily="34" charset="0"/>
+                <a:cs typeface="Arial" panose="020B0604020202020204" pitchFamily="34" charset="0"/>
+              </a:rPr>
+              <a:t>) Approach:</a:t>
+            </a:r>
+            <a:r>
+              <a:rPr lang="en-US" dirty="0" smtClean="0">
+                <a:solidFill>
+                  <a:schemeClr val="tx1"/>
+                </a:solidFill>
+                <a:latin typeface="Arial" panose="020B0604020202020204" pitchFamily="34" charset="0"/>
+                <a:cs typeface="Arial" panose="020B0604020202020204" pitchFamily="34" charset="0"/>
+              </a:rPr>
+              <a:t>  We convert the stochastic optimization model into a deterministic equivalent program (DEP), which replaces the stochastic variables with deterministic ones.  These are composed of a set containing all scenario realizations of the stochastic variables.  We use a sampling approach to trim the set to a solvable, finite form for a linear solver.</a:t>
+            </a:r>
           </a:p>
           <a:p>
             <a:pPr>
@@ -4334,245 +4385,40 @@
                 <a:spcPts val="1200"/>
               </a:spcAft>
             </a:pPr>
-            <a:endParaRPr lang="en-US" sz="3400" b="1" dirty="0" smtClean="0">
-              <a:solidFill>
-                <a:srgbClr val="FF0000"/>
-              </a:solidFill>
-              <a:latin typeface="Arial" panose="020B0604020202020204" pitchFamily="34" charset="0"/>
-              <a:cs typeface="Arial" panose="020B0604020202020204" pitchFamily="34" charset="0"/>
-            </a:endParaRPr>
-          </a:p>
-          <a:p>
-            <a:pPr>
-              <a:spcAft>
-                <a:spcPts val="1200"/>
-              </a:spcAft>
-            </a:pPr>
-            <a:endParaRPr lang="en-US" sz="3400" b="1" dirty="0">
-              <a:solidFill>
-                <a:srgbClr val="FF0000"/>
-              </a:solidFill>
-              <a:latin typeface="Arial" panose="020B0604020202020204" pitchFamily="34" charset="0"/>
-              <a:cs typeface="Arial" panose="020B0604020202020204" pitchFamily="34" charset="0"/>
-            </a:endParaRPr>
-          </a:p>
-          <a:p>
-            <a:pPr>
-              <a:spcAft>
-                <a:spcPts val="1200"/>
-              </a:spcAft>
-            </a:pPr>
-            <a:endParaRPr lang="en-US" sz="3400" b="1" dirty="0" smtClean="0">
-              <a:solidFill>
-                <a:srgbClr val="FF0000"/>
-              </a:solidFill>
-              <a:latin typeface="Arial" panose="020B0604020202020204" pitchFamily="34" charset="0"/>
-              <a:cs typeface="Arial" panose="020B0604020202020204" pitchFamily="34" charset="0"/>
-            </a:endParaRPr>
-          </a:p>
-          <a:p>
-            <a:pPr>
-              <a:spcAft>
-                <a:spcPts val="1200"/>
-              </a:spcAft>
-            </a:pPr>
-            <a:endParaRPr lang="en-US" sz="3400" b="1" dirty="0">
-              <a:solidFill>
-                <a:srgbClr val="FF0000"/>
-              </a:solidFill>
-              <a:latin typeface="Arial" panose="020B0604020202020204" pitchFamily="34" charset="0"/>
-              <a:cs typeface="Arial" panose="020B0604020202020204" pitchFamily="34" charset="0"/>
-            </a:endParaRPr>
-          </a:p>
-          <a:p>
-            <a:pPr>
-              <a:spcAft>
-                <a:spcPts val="1200"/>
-              </a:spcAft>
-            </a:pPr>
-            <a:endParaRPr lang="en-US" dirty="0" smtClean="0">
-              <a:latin typeface="Arial" panose="020B0604020202020204" pitchFamily="34" charset="0"/>
-              <a:cs typeface="Arial" panose="020B0604020202020204" pitchFamily="34" charset="0"/>
-            </a:endParaRPr>
-          </a:p>
-          <a:p>
-            <a:pPr>
-              <a:spcAft>
-                <a:spcPts val="1200"/>
-              </a:spcAft>
-            </a:pPr>
-            <a:endParaRPr lang="en-US" dirty="0">
-              <a:latin typeface="Arial" panose="020B0604020202020204" pitchFamily="34" charset="0"/>
-              <a:cs typeface="Arial" panose="020B0604020202020204" pitchFamily="34" charset="0"/>
-            </a:endParaRPr>
-          </a:p>
-          <a:p>
-            <a:pPr>
-              <a:spcAft>
-                <a:spcPts val="1200"/>
-              </a:spcAft>
-            </a:pPr>
-            <a:endParaRPr lang="en-US" dirty="0" smtClean="0">
-              <a:latin typeface="Arial" panose="020B0604020202020204" pitchFamily="34" charset="0"/>
-              <a:cs typeface="Arial" panose="020B0604020202020204" pitchFamily="34" charset="0"/>
-            </a:endParaRPr>
-          </a:p>
-          <a:p>
-            <a:pPr>
-              <a:spcAft>
-                <a:spcPts val="1200"/>
-              </a:spcAft>
-            </a:pPr>
-            <a:endParaRPr lang="en-US" dirty="0">
-              <a:latin typeface="Arial" panose="020B0604020202020204" pitchFamily="34" charset="0"/>
-              <a:cs typeface="Arial" panose="020B0604020202020204" pitchFamily="34" charset="0"/>
-            </a:endParaRPr>
-          </a:p>
-          <a:p>
-            <a:pPr>
-              <a:spcAft>
-                <a:spcPts val="1200"/>
-              </a:spcAft>
-            </a:pPr>
-            <a:endParaRPr lang="en-US" dirty="0" smtClean="0">
-              <a:latin typeface="Arial" panose="020B0604020202020204" pitchFamily="34" charset="0"/>
-              <a:cs typeface="Arial" panose="020B0604020202020204" pitchFamily="34" charset="0"/>
-            </a:endParaRPr>
-          </a:p>
-          <a:p>
-            <a:pPr>
-              <a:spcAft>
-                <a:spcPts val="1200"/>
-              </a:spcAft>
-            </a:pPr>
-            <a:endParaRPr lang="en-US" dirty="0">
-              <a:latin typeface="Arial" panose="020B0604020202020204" pitchFamily="34" charset="0"/>
-              <a:cs typeface="Arial" panose="020B0604020202020204" pitchFamily="34" charset="0"/>
-            </a:endParaRPr>
-          </a:p>
-          <a:p>
-            <a:pPr>
-              <a:spcAft>
-                <a:spcPts val="1200"/>
-              </a:spcAft>
-            </a:pPr>
-            <a:endParaRPr lang="en-US" dirty="0" smtClean="0">
-              <a:latin typeface="Arial" panose="020B0604020202020204" pitchFamily="34" charset="0"/>
-              <a:cs typeface="Arial" panose="020B0604020202020204" pitchFamily="34" charset="0"/>
-            </a:endParaRPr>
-          </a:p>
-          <a:p>
-            <a:pPr>
-              <a:spcAft>
-                <a:spcPts val="1200"/>
-              </a:spcAft>
-            </a:pPr>
-            <a:endParaRPr lang="en-US" dirty="0">
-              <a:latin typeface="Arial" panose="020B0604020202020204" pitchFamily="34" charset="0"/>
-              <a:cs typeface="Arial" panose="020B0604020202020204" pitchFamily="34" charset="0"/>
-            </a:endParaRPr>
-          </a:p>
-          <a:p>
-            <a:pPr>
-              <a:spcAft>
-                <a:spcPts val="1200"/>
-              </a:spcAft>
-            </a:pPr>
-            <a:endParaRPr lang="en-US" dirty="0" smtClean="0">
-              <a:latin typeface="Arial" panose="020B0604020202020204" pitchFamily="34" charset="0"/>
-              <a:cs typeface="Arial" panose="020B0604020202020204" pitchFamily="34" charset="0"/>
-            </a:endParaRPr>
-          </a:p>
-          <a:p>
-            <a:pPr algn="ctr">
-              <a:spcAft>
-                <a:spcPts val="1200"/>
-              </a:spcAft>
-            </a:pPr>
             <a:r>
               <a:rPr lang="en-US" b="1" dirty="0" smtClean="0">
+                <a:solidFill>
+                  <a:schemeClr val="accent2"/>
+                </a:solidFill>
                 <a:latin typeface="Arial" panose="020B0604020202020204" pitchFamily="34" charset="0"/>
                 <a:cs typeface="Arial" panose="020B0604020202020204" pitchFamily="34" charset="0"/>
               </a:rPr>
-              <a:t>Fig. 2.  Example area containing SP demand </a:t>
-            </a:r>
-            <a:r>
-              <a:rPr lang="en-US" b="1" dirty="0">
+              <a:t>Genetic Algorithm (GA) Approach:</a:t>
+            </a:r>
+            <a:r>
+              <a:rPr lang="en-US" dirty="0">
+                <a:solidFill>
+                  <a:schemeClr val="tx1"/>
+                </a:solidFill>
                 <a:latin typeface="Arial" panose="020B0604020202020204" pitchFamily="34" charset="0"/>
                 <a:cs typeface="Arial" panose="020B0604020202020204" pitchFamily="34" charset="0"/>
               </a:rPr>
-              <a:t>p</a:t>
-            </a:r>
-            <a:r>
-              <a:rPr lang="en-US" b="1" dirty="0" smtClean="0">
+              <a:t> </a:t>
+            </a:r>
+            <a:r>
+              <a:rPr lang="en-US" dirty="0" smtClean="0">
+                <a:solidFill>
+                  <a:schemeClr val="tx1"/>
+                </a:solidFill>
                 <a:latin typeface="Arial" panose="020B0604020202020204" pitchFamily="34" charset="0"/>
                 <a:cs typeface="Arial" panose="020B0604020202020204" pitchFamily="34" charset="0"/>
               </a:rPr>
-              <a:t>oints (red) and field (background; SSLT) and available RP resources (points white, </a:t>
-            </a:r>
-            <a:r>
-              <a:rPr lang="en-US" b="1" dirty="0" err="1" smtClean="0">
-                <a:latin typeface="Arial" panose="020B0604020202020204" pitchFamily="34" charset="0"/>
-                <a:cs typeface="Arial" panose="020B0604020202020204" pitchFamily="34" charset="0"/>
-              </a:rPr>
-              <a:t>Voronoi</a:t>
-            </a:r>
-            <a:r>
-              <a:rPr lang="en-US" b="1" dirty="0" smtClean="0">
-                <a:latin typeface="Arial" panose="020B0604020202020204" pitchFamily="34" charset="0"/>
-                <a:cs typeface="Arial" panose="020B0604020202020204" pitchFamily="34" charset="0"/>
-              </a:rPr>
-              <a:t> tessellation black; PPP)</a:t>
-            </a:r>
-          </a:p>
-          <a:p>
-            <a:pPr>
-              <a:spcAft>
-                <a:spcPts val="1200"/>
-              </a:spcAft>
-            </a:pPr>
-            <a:r>
-              <a:rPr lang="en-US" dirty="0" smtClean="0">
-                <a:latin typeface="Arial" panose="020B0604020202020204" pitchFamily="34" charset="0"/>
-                <a:cs typeface="Arial" panose="020B0604020202020204" pitchFamily="34" charset="0"/>
-              </a:rPr>
-              <a:t>Consider a geographic area in which a VWN is to be constructed.  A set of base stations (BSs) are available to be rented from the local RPs, each with their own cost, capacity, and coverage range.  A SP has a known continuous demand density field to satisfy, which at any given time is realizable to a set of demand points (DPs) according to the continuous field.</a:t>
-            </a:r>
-          </a:p>
-          <a:p>
-            <a:pPr>
-              <a:spcAft>
-                <a:spcPts val="1200"/>
-              </a:spcAft>
-            </a:pPr>
-            <a:r>
-              <a:rPr lang="en-US" dirty="0" smtClean="0">
-                <a:latin typeface="Arial" panose="020B0604020202020204" pitchFamily="34" charset="0"/>
-                <a:cs typeface="Arial" panose="020B0604020202020204" pitchFamily="34" charset="0"/>
-              </a:rPr>
-              <a:t>The VNB aims to find and select the base stations with minimal cost that, when allocated to the SP demand points, generates maximal demand satisfaction.  This is modeled as a two-stage stochastic optimization model, with homogenous demand points in stochastic locations.  This is not possible to solve directly, so we present two approaches to solve the model that could be run within the VNB.</a:t>
-            </a:r>
-          </a:p>
-          <a:p>
-            <a:pPr>
-              <a:spcAft>
-                <a:spcPts val="1200"/>
-              </a:spcAft>
-            </a:pPr>
-            <a:r>
-              <a:rPr lang="en-US" b="1" dirty="0" smtClean="0">
-                <a:solidFill>
-                  <a:schemeClr val="accent2"/>
-                </a:solidFill>
-                <a:latin typeface="Arial" panose="020B0604020202020204" pitchFamily="34" charset="0"/>
-                <a:cs typeface="Arial" panose="020B0604020202020204" pitchFamily="34" charset="0"/>
-              </a:rPr>
-              <a:t>Sampled Deterministic Equivalent Program (</a:t>
-            </a:r>
-            <a:r>
-              <a:rPr lang="en-US" b="1" dirty="0" err="1" smtClean="0">
-                <a:solidFill>
-                  <a:schemeClr val="accent2"/>
+              <a:t> A major restriction of the </a:t>
+            </a:r>
+            <a:r>
+              <a:rPr lang="en-US" dirty="0" err="1" smtClean="0">
+                <a:solidFill>
+                  <a:schemeClr val="tx1"/>
                 </a:solidFill>
                 <a:latin typeface="Arial" panose="020B0604020202020204" pitchFamily="34" charset="0"/>
                 <a:cs typeface="Arial" panose="020B0604020202020204" pitchFamily="34" charset="0"/>
@@ -4580,101 +4426,14 @@
               <a:t>sDEP</a:t>
             </a:r>
             <a:r>
-              <a:rPr lang="en-US" b="1" dirty="0" smtClean="0">
-                <a:solidFill>
-                  <a:schemeClr val="accent2"/>
+              <a:rPr lang="en-US" dirty="0" smtClean="0">
+                <a:solidFill>
+                  <a:schemeClr val="tx1"/>
                 </a:solidFill>
                 <a:latin typeface="Arial" panose="020B0604020202020204" pitchFamily="34" charset="0"/>
                 <a:cs typeface="Arial" panose="020B0604020202020204" pitchFamily="34" charset="0"/>
               </a:rPr>
-              <a:t>) Approach:</a:t>
-            </a:r>
-            <a:r>
-              <a:rPr lang="en-US" dirty="0" smtClean="0">
-                <a:solidFill>
-                  <a:schemeClr val="tx1"/>
-                </a:solidFill>
-                <a:latin typeface="Arial" panose="020B0604020202020204" pitchFamily="34" charset="0"/>
-                <a:cs typeface="Arial" panose="020B0604020202020204" pitchFamily="34" charset="0"/>
-              </a:rPr>
-              <a:t>  We convert the stochastic optimization model into a deterministic equivalent program (DEP), which replaces the stochastic variables with deterministic ones.  These are composed of a set containing all scenario realizations of the stochastic variables.  We use a sampling approach to trim the set to a solvable, finite form for a linear solver.</a:t>
-            </a:r>
-          </a:p>
-          <a:p>
-            <a:pPr>
-              <a:spcAft>
-                <a:spcPts val="1200"/>
-              </a:spcAft>
-            </a:pPr>
-            <a:r>
-              <a:rPr lang="en-US" b="1" dirty="0" smtClean="0">
-                <a:solidFill>
-                  <a:schemeClr val="accent2"/>
-                </a:solidFill>
-                <a:latin typeface="Arial" panose="020B0604020202020204" pitchFamily="34" charset="0"/>
-                <a:cs typeface="Arial" panose="020B0604020202020204" pitchFamily="34" charset="0"/>
-              </a:rPr>
-              <a:t>Genetic Algorithm (GA) Approach:</a:t>
-            </a:r>
-            <a:r>
-              <a:rPr lang="en-US" dirty="0">
-                <a:solidFill>
-                  <a:schemeClr val="tx1"/>
-                </a:solidFill>
-                <a:latin typeface="Arial" panose="020B0604020202020204" pitchFamily="34" charset="0"/>
-                <a:cs typeface="Arial" panose="020B0604020202020204" pitchFamily="34" charset="0"/>
-              </a:rPr>
-              <a:t> </a:t>
-            </a:r>
-            <a:r>
-              <a:rPr lang="en-US" dirty="0" smtClean="0">
-                <a:solidFill>
-                  <a:schemeClr val="tx1"/>
-                </a:solidFill>
-                <a:latin typeface="Arial" panose="020B0604020202020204" pitchFamily="34" charset="0"/>
-                <a:cs typeface="Arial" panose="020B0604020202020204" pitchFamily="34" charset="0"/>
-              </a:rPr>
-              <a:t> A major restriction of </a:t>
-            </a:r>
-            <a:r>
-              <a:rPr lang="en-US" dirty="0" smtClean="0">
-                <a:solidFill>
-                  <a:schemeClr val="tx1"/>
-                </a:solidFill>
-                <a:latin typeface="Arial" panose="020B0604020202020204" pitchFamily="34" charset="0"/>
-                <a:cs typeface="Arial" panose="020B0604020202020204" pitchFamily="34" charset="0"/>
-              </a:rPr>
-              <a:t>the </a:t>
-            </a:r>
-            <a:r>
-              <a:rPr lang="en-US" dirty="0" err="1" smtClean="0">
-                <a:solidFill>
-                  <a:schemeClr val="tx1"/>
-                </a:solidFill>
-                <a:latin typeface="Arial" panose="020B0604020202020204" pitchFamily="34" charset="0"/>
-                <a:cs typeface="Arial" panose="020B0604020202020204" pitchFamily="34" charset="0"/>
-              </a:rPr>
-              <a:t>sDEP</a:t>
-            </a:r>
-            <a:r>
-              <a:rPr lang="en-US" dirty="0" smtClean="0">
-                <a:solidFill>
-                  <a:schemeClr val="tx1"/>
-                </a:solidFill>
-                <a:latin typeface="Arial" panose="020B0604020202020204" pitchFamily="34" charset="0"/>
-                <a:cs typeface="Arial" panose="020B0604020202020204" pitchFamily="34" charset="0"/>
-              </a:rPr>
-              <a:t> </a:t>
-            </a:r>
-            <a:r>
-              <a:rPr lang="en-US" dirty="0" smtClean="0">
-                <a:solidFill>
-                  <a:schemeClr val="tx1"/>
-                </a:solidFill>
-                <a:latin typeface="Arial" panose="020B0604020202020204" pitchFamily="34" charset="0"/>
-                <a:cs typeface="Arial" panose="020B0604020202020204" pitchFamily="34" charset="0"/>
-              </a:rPr>
-              <a:t>approach is its intractability.  The GA approach attempts to find a tractable approximate solution to the base station selection stage.</a:t>
+              <a:t> approach is its intractability.  The GA approach attempts to find a tractable approximate solution to the base station selection stage.</a:t>
             </a:r>
           </a:p>
           <a:p>
@@ -4809,7 +4568,7 @@
                 <a:spcPts val="1200"/>
               </a:spcAft>
             </a:pPr>
-            <a:endParaRPr lang="en-US" dirty="0" smtClean="0">
+            <a:endParaRPr lang="en-US" b="1" dirty="0">
               <a:solidFill>
                 <a:schemeClr val="tx1"/>
               </a:solidFill>
@@ -4818,42 +4577,12 @@
             </a:endParaRPr>
           </a:p>
           <a:p>
-            <a:pPr algn="ctr">
+            <a:pPr>
               <a:spcAft>
                 <a:spcPts val="1200"/>
               </a:spcAft>
             </a:pPr>
-            <a:r>
-              <a:rPr lang="en-US" b="1" dirty="0" smtClean="0">
-                <a:solidFill>
-                  <a:schemeClr val="tx1"/>
-                </a:solidFill>
-                <a:latin typeface="Arial" panose="020B0604020202020204" pitchFamily="34" charset="0"/>
-                <a:cs typeface="Arial" panose="020B0604020202020204" pitchFamily="34" charset="0"/>
-              </a:rPr>
-              <a:t>Fig</a:t>
-            </a:r>
-            <a:r>
-              <a:rPr lang="en-US" b="1" dirty="0">
-                <a:solidFill>
-                  <a:schemeClr val="tx1"/>
-                </a:solidFill>
-                <a:latin typeface="Arial" panose="020B0604020202020204" pitchFamily="34" charset="0"/>
-                <a:cs typeface="Arial" panose="020B0604020202020204" pitchFamily="34" charset="0"/>
-              </a:rPr>
-              <a:t>. 3. Genetic Algorithm </a:t>
-            </a:r>
-            <a:r>
-              <a:rPr lang="en-US" b="1" dirty="0" smtClean="0">
-                <a:solidFill>
-                  <a:schemeClr val="tx1"/>
-                </a:solidFill>
-                <a:latin typeface="Arial" panose="020B0604020202020204" pitchFamily="34" charset="0"/>
-                <a:cs typeface="Arial" panose="020B0604020202020204" pitchFamily="34" charset="0"/>
-              </a:rPr>
-              <a:t>Flowchart</a:t>
-            </a:r>
-            <a:endParaRPr lang="en-US" b="1" dirty="0">
+            <a:endParaRPr lang="en-US" b="1" dirty="0" smtClean="0">
               <a:solidFill>
                 <a:schemeClr val="tx1"/>
               </a:solidFill>
@@ -4885,7 +4614,7 @@
         </p:blipFill>
         <p:spPr>
           <a:xfrm>
-            <a:off x="11446290" y="26348915"/>
+            <a:off x="11402679" y="15365165"/>
             <a:ext cx="9207081" cy="5185185"/>
           </a:xfrm>
           <a:prstGeom prst="rect">
@@ -5591,7 +5320,7 @@
         <p:spPr bwMode="auto">
           <a:xfrm>
             <a:off x="6540500" y="1193800"/>
-            <a:ext cx="12820650" cy="923925"/>
+            <a:ext cx="12820650" cy="934306"/>
           </a:xfrm>
           <a:prstGeom prst="rect">
             <a:avLst/>
@@ -5765,7 +5494,7 @@
               <a:buNone/>
             </a:pPr>
             <a:r>
-              <a:rPr lang="en-US" altLang="en-US" sz="3400" i="1">
+              <a:rPr lang="en-US" altLang="en-US" sz="3400" i="1" dirty="0">
                 <a:solidFill>
                   <a:srgbClr val="000000"/>
                 </a:solidFill>
@@ -5774,14 +5503,38 @@
               <a:t> </a:t>
             </a:r>
             <a:r>
-              <a:rPr lang="en-US" altLang="en-US" sz="4000" i="1">
+              <a:rPr lang="en-US" altLang="en-US" sz="4000" i="1" dirty="0">
                 <a:solidFill>
                   <a:srgbClr val="000000"/>
                 </a:solidFill>
                 <a:latin typeface="Arial" panose="020B0604020202020204" pitchFamily="34" charset="0"/>
               </a:rPr>
-              <a:t>Sponsored by: (40 point)</a:t>
-            </a:r>
+              <a:t>Sponsored </a:t>
+            </a:r>
+            <a:r>
+              <a:rPr lang="en-US" altLang="en-US" sz="4000" i="1" dirty="0" smtClean="0">
+                <a:solidFill>
+                  <a:srgbClr val="000000"/>
+                </a:solidFill>
+                <a:latin typeface="Arial" panose="020B0604020202020204" pitchFamily="34" charset="0"/>
+              </a:rPr>
+              <a:t>by</a:t>
+            </a:r>
+            <a:r>
+              <a:rPr lang="en-US" altLang="en-US" sz="4000" i="1" dirty="0" smtClean="0">
+                <a:solidFill>
+                  <a:srgbClr val="000000"/>
+                </a:solidFill>
+                <a:latin typeface="Arial" panose="020B0604020202020204" pitchFamily="34" charset="0"/>
+              </a:rPr>
+              <a:t>: National Science Foundation</a:t>
+            </a:r>
+            <a:endParaRPr lang="en-US" altLang="en-US" sz="4000" i="1" dirty="0">
+              <a:solidFill>
+                <a:srgbClr val="000000"/>
+              </a:solidFill>
+              <a:latin typeface="Arial" panose="020B0604020202020204" pitchFamily="34" charset="0"/>
+            </a:endParaRPr>
           </a:p>
         </p:txBody>
       </p:sp>
@@ -7004,8 +6757,8 @@
         </p:nvSpPr>
         <p:spPr>
           <a:xfrm>
-            <a:off x="1104898" y="13746758"/>
-            <a:ext cx="9608054" cy="10156627"/>
+            <a:off x="1104898" y="13510782"/>
+            <a:ext cx="9608054" cy="9602629"/>
           </a:xfrm>
           <a:prstGeom prst="rect">
             <a:avLst/>
@@ -7131,15 +6884,6 @@
             </a:endParaRPr>
           </a:p>
           <a:p>
-            <a:endParaRPr lang="en-US" sz="3600" dirty="0">
-              <a:solidFill>
-                <a:srgbClr val="FF0000"/>
-              </a:solidFill>
-              <a:latin typeface="Arial" panose="020B0604020202020204" pitchFamily="34" charset="0"/>
-              <a:cs typeface="Arial" panose="020B0604020202020204" pitchFamily="34" charset="0"/>
-            </a:endParaRPr>
-          </a:p>
-          <a:p>
             <a:endParaRPr lang="en-US" sz="3600" dirty="0" smtClean="0">
               <a:solidFill>
                 <a:srgbClr val="FF0000"/>
@@ -7162,7 +6906,17 @@
                 <a:latin typeface="Arial" panose="020B0604020202020204" pitchFamily="34" charset="0"/>
                 <a:cs typeface="Arial" panose="020B0604020202020204" pitchFamily="34" charset="0"/>
               </a:rPr>
-              <a:t>Service Provider (SP):  </a:t>
+              <a:t>Service </a:t>
+            </a:r>
+            <a:r>
+              <a:rPr lang="en-US" b="1" dirty="0" smtClean="0">
+                <a:solidFill>
+                  <a:schemeClr val="accent2"/>
+                </a:solidFill>
+                <a:latin typeface="Arial" panose="020B0604020202020204" pitchFamily="34" charset="0"/>
+                <a:cs typeface="Arial" panose="020B0604020202020204" pitchFamily="34" charset="0"/>
+              </a:rPr>
+              <a:t>Provider (SP):  </a:t>
             </a:r>
             <a:r>
               <a:rPr lang="en-US" dirty="0" smtClean="0">
@@ -7219,7 +6973,27 @@
                 <a:latin typeface="Arial" panose="020B0604020202020204" pitchFamily="34" charset="0"/>
                 <a:cs typeface="Arial" panose="020B0604020202020204" pitchFamily="34" charset="0"/>
               </a:rPr>
-              <a:t>  Consists of a Virtual Network Architect.  It composes and aggregates the virtual resources from the resource providers (RPs) to build virtual networks for the SPs.</a:t>
+              <a:t>  </a:t>
+            </a:r>
+            <a:r>
+              <a:rPr lang="en-US" dirty="0" smtClean="0">
+                <a:solidFill>
+                  <a:schemeClr val="tx1"/>
+                </a:solidFill>
+                <a:latin typeface="Arial" panose="020B0604020202020204" pitchFamily="34" charset="0"/>
+                <a:cs typeface="Arial" panose="020B0604020202020204" pitchFamily="34" charset="0"/>
+              </a:rPr>
+              <a:t>It </a:t>
+            </a:r>
+            <a:r>
+              <a:rPr lang="en-US" dirty="0" smtClean="0">
+                <a:solidFill>
+                  <a:schemeClr val="tx1"/>
+                </a:solidFill>
+                <a:latin typeface="Arial" panose="020B0604020202020204" pitchFamily="34" charset="0"/>
+                <a:cs typeface="Arial" panose="020B0604020202020204" pitchFamily="34" charset="0"/>
+              </a:rPr>
+              <a:t>composes and aggregates the virtual resources from the resource providers (RPs) to build virtual networks for the SPs.</a:t>
             </a:r>
           </a:p>
           <a:p>
@@ -7246,7 +7020,47 @@
                 <a:latin typeface="Arial" panose="020B0604020202020204" pitchFamily="34" charset="0"/>
                 <a:cs typeface="Arial" panose="020B0604020202020204" pitchFamily="34" charset="0"/>
               </a:rPr>
-              <a:t>  The owner of a set of resources that can be offered as virtual resources in a set of pools, according to contracts established with VNBs or NAs, for example.  In general, an RP will define how to slice and share its resources as virtual ones.</a:t>
+              <a:t>  The owner of a set of resources that can be offered as </a:t>
+            </a:r>
+            <a:r>
+              <a:rPr lang="en-US" dirty="0" smtClean="0">
+                <a:solidFill>
+                  <a:schemeClr val="tx1"/>
+                </a:solidFill>
+                <a:latin typeface="Arial" panose="020B0604020202020204" pitchFamily="34" charset="0"/>
+                <a:cs typeface="Arial" panose="020B0604020202020204" pitchFamily="34" charset="0"/>
+              </a:rPr>
+              <a:t>virtual resources, </a:t>
+            </a:r>
+            <a:r>
+              <a:rPr lang="en-US" dirty="0" smtClean="0">
+                <a:solidFill>
+                  <a:schemeClr val="tx1"/>
+                </a:solidFill>
+                <a:latin typeface="Arial" panose="020B0604020202020204" pitchFamily="34" charset="0"/>
+                <a:cs typeface="Arial" panose="020B0604020202020204" pitchFamily="34" charset="0"/>
+              </a:rPr>
+              <a:t>according to contracts established with VNBs or NAs, </a:t>
+            </a:r>
+            <a:r>
+              <a:rPr lang="en-US" dirty="0" smtClean="0">
+                <a:solidFill>
+                  <a:schemeClr val="tx1"/>
+                </a:solidFill>
+                <a:latin typeface="Arial" panose="020B0604020202020204" pitchFamily="34" charset="0"/>
+                <a:cs typeface="Arial" panose="020B0604020202020204" pitchFamily="34" charset="0"/>
+              </a:rPr>
+              <a:t>for </a:t>
+            </a:r>
+            <a:r>
+              <a:rPr lang="en-US" dirty="0" smtClean="0">
+                <a:solidFill>
+                  <a:schemeClr val="tx1"/>
+                </a:solidFill>
+                <a:latin typeface="Arial" panose="020B0604020202020204" pitchFamily="34" charset="0"/>
+                <a:cs typeface="Arial" panose="020B0604020202020204" pitchFamily="34" charset="0"/>
+              </a:rPr>
+              <a:t>example.  In general, an RP will define how to slice and share its resources as virtual ones.</a:t>
             </a:r>
           </a:p>
         </p:txBody>
@@ -7259,7 +7073,7 @@
         </p:nvSpPr>
         <p:spPr>
           <a:xfrm>
-            <a:off x="1104898" y="18765716"/>
+            <a:off x="1104898" y="18175776"/>
             <a:ext cx="9608054" cy="461665"/>
           </a:xfrm>
           <a:prstGeom prst="rect">
@@ -7304,7 +7118,7 @@
         </p:blipFill>
         <p:spPr>
           <a:xfrm>
-            <a:off x="1298752" y="14741766"/>
+            <a:off x="1298752" y="14151826"/>
             <a:ext cx="9220345" cy="4023950"/>
           </a:xfrm>
           <a:prstGeom prst="rect">
@@ -7334,8 +7148,8 @@
         </p:blipFill>
         <p:spPr>
           <a:xfrm>
-            <a:off x="11446290" y="7489776"/>
-            <a:ext cx="9207081" cy="9192396"/>
+            <a:off x="2072502" y="23371147"/>
+            <a:ext cx="7672844" cy="7660606"/>
           </a:xfrm>
           <a:prstGeom prst="rect">
             <a:avLst/>
@@ -7350,8 +7164,8 @@
         </p:nvSpPr>
         <p:spPr>
           <a:xfrm>
-            <a:off x="1104898" y="24216852"/>
-            <a:ext cx="9608054" cy="8217634"/>
+            <a:off x="11171735" y="21530399"/>
+            <a:ext cx="9668960" cy="9171742"/>
           </a:xfrm>
           <a:prstGeom prst="rect">
             <a:avLst/>
@@ -7493,38 +7307,33 @@
             </a:endParaRPr>
           </a:p>
           <a:p>
-            <a:pPr algn="ctr">
-              <a:spcAft>
-                <a:spcPts val="1200"/>
-              </a:spcAft>
-            </a:pPr>
-            <a:r>
-              <a:rPr lang="en-US" b="1" dirty="0" smtClean="0">
+            <a:endParaRPr lang="en-US" dirty="0" smtClean="0">
+              <a:latin typeface="Arial" panose="020B0604020202020204" pitchFamily="34" charset="0"/>
+              <a:cs typeface="Arial" panose="020B0604020202020204" pitchFamily="34" charset="0"/>
+            </a:endParaRPr>
+          </a:p>
+          <a:p>
+            <a:endParaRPr lang="en-US" dirty="0" smtClean="0">
+              <a:latin typeface="Arial" panose="020B0604020202020204" pitchFamily="34" charset="0"/>
+              <a:cs typeface="Arial" panose="020B0604020202020204" pitchFamily="34" charset="0"/>
+            </a:endParaRPr>
+          </a:p>
+          <a:p>
+            <a:r>
+              <a:rPr lang="en-US" dirty="0" smtClean="0">
                 <a:latin typeface="Arial" panose="020B0604020202020204" pitchFamily="34" charset="0"/>
                 <a:cs typeface="Arial" panose="020B0604020202020204" pitchFamily="34" charset="0"/>
               </a:rPr>
-              <a:t>Fig. 4.  CPU Runtime and BS Costs of </a:t>
-            </a:r>
-            <a:r>
-              <a:rPr lang="en-US" b="1" dirty="0" err="1" smtClean="0">
+              <a:t>Do an analysis of how the GA changes as the data set increases?</a:t>
+            </a:r>
+          </a:p>
+          <a:p>
+            <a:r>
+              <a:rPr lang="en-US" dirty="0" smtClean="0">
                 <a:latin typeface="Arial" panose="020B0604020202020204" pitchFamily="34" charset="0"/>
                 <a:cs typeface="Arial" panose="020B0604020202020204" pitchFamily="34" charset="0"/>
               </a:rPr>
-              <a:t>sDEP</a:t>
-            </a:r>
-            <a:r>
-              <a:rPr lang="en-US" b="1" dirty="0">
-                <a:latin typeface="Arial" panose="020B0604020202020204" pitchFamily="34" charset="0"/>
-                <a:cs typeface="Arial" panose="020B0604020202020204" pitchFamily="34" charset="0"/>
-              </a:rPr>
-              <a:t>,</a:t>
-            </a:r>
-            <a:r>
-              <a:rPr lang="en-US" b="1" dirty="0" smtClean="0">
-                <a:latin typeface="Arial" panose="020B0604020202020204" pitchFamily="34" charset="0"/>
-                <a:cs typeface="Arial" panose="020B0604020202020204" pitchFamily="34" charset="0"/>
-              </a:rPr>
-              <a:t> GA Approaches</a:t>
+              <a:t>Differing number of DPs, BSs, and Scenarios</a:t>
             </a:r>
           </a:p>
           <a:p>
@@ -7537,7 +7346,14 @@
                 <a:latin typeface="Arial" panose="020B0604020202020204" pitchFamily="34" charset="0"/>
                 <a:cs typeface="Arial" panose="020B0604020202020204" pitchFamily="34" charset="0"/>
               </a:rPr>
-              <a:t>GA has a speedup ratio of 45-50 to 5-10 compared to the </a:t>
+              <a:t>GA </a:t>
+            </a:r>
+            <a:r>
+              <a:rPr lang="en-US" dirty="0" smtClean="0">
+                <a:latin typeface="Arial" panose="020B0604020202020204" pitchFamily="34" charset="0"/>
+                <a:cs typeface="Arial" panose="020B0604020202020204" pitchFamily="34" charset="0"/>
+              </a:rPr>
+              <a:t>has a speedup ratio of 45-50 to 5-10 compared to the </a:t>
             </a:r>
             <a:r>
               <a:rPr lang="en-US" dirty="0" err="1" smtClean="0">
@@ -7561,14 +7377,7 @@
                 <a:latin typeface="Arial" panose="020B0604020202020204" pitchFamily="34" charset="0"/>
                 <a:cs typeface="Arial" panose="020B0604020202020204" pitchFamily="34" charset="0"/>
               </a:rPr>
-              <a:t>GA </a:t>
-            </a:r>
-            <a:r>
-              <a:rPr lang="en-US" dirty="0" smtClean="0">
-                <a:latin typeface="Arial" panose="020B0604020202020204" pitchFamily="34" charset="0"/>
-                <a:cs typeface="Arial" panose="020B0604020202020204" pitchFamily="34" charset="0"/>
-              </a:rPr>
-              <a:t>incurs appx. 20% (2 BSs) additional cost compared to </a:t>
+              <a:t>GA incurs appx. 20% (2 BSs) additional cost compared to </a:t>
             </a:r>
             <a:r>
               <a:rPr lang="en-US" dirty="0" err="1" smtClean="0">
@@ -7646,7 +7455,7 @@
         </p:blipFill>
         <p:spPr>
           <a:xfrm>
-            <a:off x="1524001" y="27022599"/>
+            <a:off x="11651744" y="24336146"/>
             <a:ext cx="8537823" cy="2549351"/>
           </a:xfrm>
           <a:prstGeom prst="rect">
@@ -7676,7 +7485,7 @@
         </p:blipFill>
         <p:spPr>
           <a:xfrm>
-            <a:off x="1524001" y="24714200"/>
+            <a:off x="11651744" y="22027747"/>
             <a:ext cx="8537823" cy="2579227"/>
           </a:xfrm>
           <a:prstGeom prst="rect">
@@ -7684,6 +7493,132 @@
           </a:prstGeom>
         </p:spPr>
       </p:pic>
+      <p:sp>
+        <p:nvSpPr>
+          <p:cNvPr id="8" name="TextBox 7"/>
+          <p:cNvSpPr txBox="1"/>
+          <p:nvPr/>
+        </p:nvSpPr>
+        <p:spPr>
+          <a:xfrm>
+            <a:off x="1104898" y="31203900"/>
+            <a:ext cx="9608046" cy="1200329"/>
+          </a:xfrm>
+          <a:prstGeom prst="rect">
+            <a:avLst/>
+          </a:prstGeom>
+          <a:noFill/>
+        </p:spPr>
+        <p:txBody>
+          <a:bodyPr wrap="square" rtlCol="0">
+            <a:spAutoFit/>
+          </a:bodyPr>
+          <a:lstStyle/>
+          <a:p>
+            <a:pPr algn="ctr"/>
+            <a:r>
+              <a:rPr lang="en-US" b="1" dirty="0"/>
+              <a:t>Fig. </a:t>
+            </a:r>
+            <a:r>
+              <a:rPr lang="en-US" b="1" dirty="0" smtClean="0"/>
+              <a:t>2. Example area containing SP demand points (red) and field (background; SSLT) and available RP resources (points white, </a:t>
+            </a:r>
+            <a:r>
+              <a:rPr lang="en-US" b="1" dirty="0" err="1" smtClean="0"/>
+              <a:t>Voronoi</a:t>
+            </a:r>
+            <a:r>
+              <a:rPr lang="en-US" b="1" dirty="0" smtClean="0"/>
+              <a:t> tessellation black; PPP)</a:t>
+            </a:r>
+            <a:endParaRPr lang="en-US" b="1" dirty="0"/>
+          </a:p>
+        </p:txBody>
+      </p:sp>
+      <p:sp>
+        <p:nvSpPr>
+          <p:cNvPr id="29" name="TextBox 28"/>
+          <p:cNvSpPr txBox="1"/>
+          <p:nvPr/>
+        </p:nvSpPr>
+        <p:spPr>
+          <a:xfrm>
+            <a:off x="11202193" y="20709100"/>
+            <a:ext cx="9608046" cy="461665"/>
+          </a:xfrm>
+          <a:prstGeom prst="rect">
+            <a:avLst/>
+          </a:prstGeom>
+          <a:noFill/>
+        </p:spPr>
+        <p:txBody>
+          <a:bodyPr wrap="square" rtlCol="0">
+            <a:spAutoFit/>
+          </a:bodyPr>
+          <a:lstStyle/>
+          <a:p>
+            <a:pPr algn="ctr"/>
+            <a:r>
+              <a:rPr lang="en-US" b="1" dirty="0"/>
+              <a:t>Fig. 3</a:t>
+            </a:r>
+            <a:r>
+              <a:rPr lang="en-US" b="1" dirty="0" smtClean="0"/>
+              <a:t>. Genetic Algorithm Flowchart</a:t>
+            </a:r>
+            <a:endParaRPr lang="en-US" b="1" dirty="0"/>
+          </a:p>
+        </p:txBody>
+      </p:sp>
+      <p:sp>
+        <p:nvSpPr>
+          <p:cNvPr id="30" name="TextBox 29"/>
+          <p:cNvSpPr txBox="1"/>
+          <p:nvPr/>
+        </p:nvSpPr>
+        <p:spPr>
+          <a:xfrm>
+            <a:off x="11171735" y="27099104"/>
+            <a:ext cx="9668959" cy="461665"/>
+          </a:xfrm>
+          <a:prstGeom prst="rect">
+            <a:avLst/>
+          </a:prstGeom>
+          <a:noFill/>
+        </p:spPr>
+        <p:txBody>
+          <a:bodyPr wrap="square" rtlCol="0">
+            <a:spAutoFit/>
+          </a:bodyPr>
+          <a:lstStyle/>
+          <a:p>
+            <a:pPr algn="ctr">
+              <a:spcAft>
+                <a:spcPts val="1200"/>
+              </a:spcAft>
+            </a:pPr>
+            <a:r>
+              <a:rPr lang="en-US" b="1" dirty="0">
+                <a:cs typeface="Arial" panose="020B0604020202020204" pitchFamily="34" charset="0"/>
+              </a:rPr>
+              <a:t>Fig. 4.  CPU Runtime and BS Costs of </a:t>
+            </a:r>
+            <a:r>
+              <a:rPr lang="en-US" b="1" dirty="0" err="1">
+                <a:cs typeface="Arial" panose="020B0604020202020204" pitchFamily="34" charset="0"/>
+              </a:rPr>
+              <a:t>sDEP</a:t>
+            </a:r>
+            <a:r>
+              <a:rPr lang="en-US" b="1" dirty="0">
+                <a:cs typeface="Arial" panose="020B0604020202020204" pitchFamily="34" charset="0"/>
+              </a:rPr>
+              <a:t>, GA Approaches</a:t>
+            </a:r>
+          </a:p>
+        </p:txBody>
+      </p:sp>
     </p:spTree>
   </p:cSld>
   <p:clrMapOvr>

</xml_diff>